<commit_message>
Update Engineering Organization Chart.pptx
</commit_message>
<xml_diff>
--- a/Engineering Organization Chart.pptx
+++ b/Engineering Organization Chart.pptx
@@ -5,13 +5,14 @@
     <p:sldMasterId id="2147484759" r:id="rId4"/>
   </p:sldMasterIdLst>
   <p:notesMasterIdLst>
-    <p:notesMasterId r:id="rId6"/>
+    <p:notesMasterId r:id="rId7"/>
   </p:notesMasterIdLst>
   <p:handoutMasterIdLst>
-    <p:handoutMasterId r:id="rId7"/>
+    <p:handoutMasterId r:id="rId8"/>
   </p:handoutMasterIdLst>
   <p:sldIdLst>
     <p:sldId id="260" r:id="rId5"/>
+    <p:sldId id="261" r:id="rId6"/>
   </p:sldIdLst>
   <p:sldSz cx="12192000" cy="6858000"/>
   <p:notesSz cx="6858000" cy="9144000"/>
@@ -221,7 +222,7 @@
           <a:p>
             <a:fld id="{CB7AD89C-BB88-48A3-A1C9-D13CF625B286}" type="datetimeFigureOut">
               <a:rPr lang="en-US" smtClean="0"/>
-              <a:t>6/11/2019</a:t>
+              <a:t>6/13/2019</a:t>
             </a:fld>
             <a:endParaRPr lang="en-US" dirty="0"/>
           </a:p>
@@ -398,7 +399,7 @@
           <a:p>
             <a:fld id="{EFD09F21-8F1F-4129-8AEA-7EF5D9ADF331}" type="datetimeFigureOut">
               <a:rPr lang="en-US" smtClean="0"/>
-              <a:t>6/11/2019</a:t>
+              <a:t>6/13/2019</a:t>
             </a:fld>
             <a:endParaRPr lang="en-US" dirty="0"/>
           </a:p>
@@ -749,6 +750,90 @@
 </p:notes>
 </file>
 
+<file path=ppt/notesSlides/notesSlide2.xml><?xml version="1.0" encoding="utf-8"?>
+<p:notes xmlns:a="http://schemas.openxmlformats.org/drawingml/2006/main" xmlns:r="http://schemas.openxmlformats.org/officeDocument/2006/relationships" xmlns:p="http://schemas.openxmlformats.org/presentationml/2006/main">
+  <p:cSld>
+    <p:spTree>
+      <p:nvGrpSpPr>
+        <p:cNvPr id="1" name=""/>
+        <p:cNvGrpSpPr/>
+        <p:nvPr/>
+      </p:nvGrpSpPr>
+      <p:grpSpPr>
+        <a:xfrm>
+          <a:off x="0" y="0"/>
+          <a:ext cx="0" cy="0"/>
+          <a:chOff x="0" y="0"/>
+          <a:chExt cx="0" cy="0"/>
+        </a:xfrm>
+      </p:grpSpPr>
+      <p:sp>
+        <p:nvSpPr>
+          <p:cNvPr id="2" name="Slide Image Placeholder 1"/>
+          <p:cNvSpPr>
+            <a:spLocks noGrp="1" noRot="1" noChangeAspect="1"/>
+          </p:cNvSpPr>
+          <p:nvPr>
+            <p:ph type="sldImg"/>
+          </p:nvPr>
+        </p:nvSpPr>
+        <p:spPr/>
+      </p:sp>
+      <p:sp>
+        <p:nvSpPr>
+          <p:cNvPr id="3" name="Notes Placeholder 2"/>
+          <p:cNvSpPr>
+            <a:spLocks noGrp="1"/>
+          </p:cNvSpPr>
+          <p:nvPr>
+            <p:ph type="body" idx="1"/>
+          </p:nvPr>
+        </p:nvSpPr>
+        <p:spPr/>
+        <p:txBody>
+          <a:bodyPr/>
+          <a:lstStyle/>
+          <a:p>
+            <a:endParaRPr lang="en-US" dirty="0"/>
+          </a:p>
+        </p:txBody>
+      </p:sp>
+      <p:sp>
+        <p:nvSpPr>
+          <p:cNvPr id="4" name="Slide Number Placeholder 3"/>
+          <p:cNvSpPr>
+            <a:spLocks noGrp="1"/>
+          </p:cNvSpPr>
+          <p:nvPr>
+            <p:ph type="sldNum" sz="quarter" idx="5"/>
+          </p:nvPr>
+        </p:nvSpPr>
+        <p:spPr/>
+        <p:txBody>
+          <a:bodyPr/>
+          <a:lstStyle/>
+          <a:p>
+            <a:fld id="{B32C31BA-67D8-413F-A5DD-028125073D1D}" type="slidenum">
+              <a:rPr lang="en-US" smtClean="0"/>
+              <a:t>2</a:t>
+            </a:fld>
+            <a:endParaRPr lang="en-US" dirty="0"/>
+          </a:p>
+        </p:txBody>
+      </p:sp>
+    </p:spTree>
+    <p:extLst>
+      <p:ext uri="{BB962C8B-B14F-4D97-AF65-F5344CB8AC3E}">
+        <p14:creationId xmlns:p14="http://schemas.microsoft.com/office/powerpoint/2010/main" val="3583550840"/>
+      </p:ext>
+    </p:extLst>
+  </p:cSld>
+  <p:clrMapOvr>
+    <a:masterClrMapping/>
+  </p:clrMapOvr>
+</p:notes>
+</file>
+
 <file path=ppt/slideLayouts/slideLayout1.xml><?xml version="1.0" encoding="utf-8"?>
 <p:sldLayout xmlns:a="http://schemas.openxmlformats.org/drawingml/2006/main" xmlns:r="http://schemas.openxmlformats.org/officeDocument/2006/relationships" xmlns:p="http://schemas.openxmlformats.org/presentationml/2006/main" type="title" preserve="1">
   <p:cSld name="Title Slide">
@@ -976,7 +1061,7 @@
           <a:p>
             <a:fld id="{74929172-4BF7-429F-BA25-7E9D1A4215EE}" type="datetimeFigureOut">
               <a:rPr lang="en-US" noProof="0" smtClean="0"/>
-              <a:t>6/11/2019</a:t>
+              <a:t>6/13/2019</a:t>
             </a:fld>
             <a:endParaRPr lang="en-US" noProof="0" dirty="0"/>
           </a:p>
@@ -1314,7 +1399,7 @@
           <a:p>
             <a:fld id="{74929172-4BF7-429F-BA25-7E9D1A4215EE}" type="datetimeFigureOut">
               <a:rPr lang="en-US" noProof="0" smtClean="0"/>
-              <a:t>6/11/2019</a:t>
+              <a:t>6/13/2019</a:t>
             </a:fld>
             <a:endParaRPr lang="en-US" noProof="0" dirty="0"/>
           </a:p>
@@ -1591,7 +1676,7 @@
           <a:p>
             <a:fld id="{74929172-4BF7-429F-BA25-7E9D1A4215EE}" type="datetimeFigureOut">
               <a:rPr lang="en-US" noProof="0" smtClean="0"/>
-              <a:t>6/11/2019</a:t>
+              <a:t>6/13/2019</a:t>
             </a:fld>
             <a:endParaRPr lang="en-US" noProof="0" dirty="0"/>
           </a:p>
@@ -2158,7 +2243,7 @@
           <a:p>
             <a:fld id="{74929172-4BF7-429F-BA25-7E9D1A4215EE}" type="datetimeFigureOut">
               <a:rPr lang="en-US" noProof="0" smtClean="0"/>
-              <a:t>6/11/2019</a:t>
+              <a:t>6/13/2019</a:t>
             </a:fld>
             <a:endParaRPr lang="en-US" noProof="0" dirty="0"/>
           </a:p>
@@ -2435,7 +2520,7 @@
           <a:p>
             <a:fld id="{74929172-4BF7-429F-BA25-7E9D1A4215EE}" type="datetimeFigureOut">
               <a:rPr lang="en-US" noProof="0" smtClean="0"/>
-              <a:t>6/11/2019</a:t>
+              <a:t>6/13/2019</a:t>
             </a:fld>
             <a:endParaRPr lang="en-US" noProof="0" dirty="0"/>
           </a:p>
@@ -2996,7 +3081,7 @@
           <a:p>
             <a:fld id="{74929172-4BF7-429F-BA25-7E9D1A4215EE}" type="datetimeFigureOut">
               <a:rPr lang="en-US" noProof="0" smtClean="0"/>
-              <a:t>6/11/2019</a:t>
+              <a:t>6/13/2019</a:t>
             </a:fld>
             <a:endParaRPr lang="en-US" noProof="0" dirty="0"/>
           </a:p>
@@ -3322,7 +3407,7 @@
           <a:p>
             <a:fld id="{74929172-4BF7-429F-BA25-7E9D1A4215EE}" type="datetimeFigureOut">
               <a:rPr lang="en-US" noProof="0" smtClean="0"/>
-              <a:t>6/11/2019</a:t>
+              <a:t>6/13/2019</a:t>
             </a:fld>
             <a:endParaRPr lang="en-US" noProof="0" dirty="0"/>
           </a:p>
@@ -3498,7 +3583,7 @@
           <a:p>
             <a:fld id="{74929172-4BF7-429F-BA25-7E9D1A4215EE}" type="datetimeFigureOut">
               <a:rPr lang="en-US" noProof="0" smtClean="0"/>
-              <a:t>6/11/2019</a:t>
+              <a:t>6/13/2019</a:t>
             </a:fld>
             <a:endParaRPr lang="en-US" noProof="0" dirty="0"/>
           </a:p>
@@ -3733,7 +3818,7 @@
           <a:p>
             <a:fld id="{74929172-4BF7-429F-BA25-7E9D1A4215EE}" type="datetimeFigureOut">
               <a:rPr lang="en-US" noProof="0" smtClean="0"/>
-              <a:t>6/11/2019</a:t>
+              <a:t>6/13/2019</a:t>
             </a:fld>
             <a:endParaRPr lang="en-US" noProof="0" dirty="0"/>
           </a:p>
@@ -3936,7 +4021,7 @@
           <a:p>
             <a:fld id="{74929172-4BF7-429F-BA25-7E9D1A4215EE}" type="datetimeFigureOut">
               <a:rPr lang="en-US" noProof="0" smtClean="0"/>
-              <a:t>6/11/2019</a:t>
+              <a:t>6/13/2019</a:t>
             </a:fld>
             <a:endParaRPr lang="en-US" noProof="0" dirty="0"/>
           </a:p>
@@ -4211,7 +4296,7 @@
           <a:p>
             <a:fld id="{74929172-4BF7-429F-BA25-7E9D1A4215EE}" type="datetimeFigureOut">
               <a:rPr lang="en-US" noProof="0" smtClean="0"/>
-              <a:t>6/11/2019</a:t>
+              <a:t>6/13/2019</a:t>
             </a:fld>
             <a:endParaRPr lang="en-US" noProof="0" dirty="0"/>
           </a:p>
@@ -4479,7 +4564,7 @@
           <a:p>
             <a:fld id="{74929172-4BF7-429F-BA25-7E9D1A4215EE}" type="datetimeFigureOut">
               <a:rPr lang="en-US" noProof="0" smtClean="0"/>
-              <a:t>6/11/2019</a:t>
+              <a:t>6/13/2019</a:t>
             </a:fld>
             <a:endParaRPr lang="en-US" noProof="0" dirty="0"/>
           </a:p>
@@ -4850,7 +4935,7 @@
           <a:p>
             <a:fld id="{74929172-4BF7-429F-BA25-7E9D1A4215EE}" type="datetimeFigureOut">
               <a:rPr lang="en-US" noProof="0" smtClean="0"/>
-              <a:t>6/11/2019</a:t>
+              <a:t>6/13/2019</a:t>
             </a:fld>
             <a:endParaRPr lang="en-US" noProof="0" dirty="0"/>
           </a:p>
@@ -4997,7 +5082,7 @@
           <a:p>
             <a:fld id="{74929172-4BF7-429F-BA25-7E9D1A4215EE}" type="datetimeFigureOut">
               <a:rPr lang="en-US" noProof="0" smtClean="0"/>
-              <a:t>6/11/2019</a:t>
+              <a:t>6/13/2019</a:t>
             </a:fld>
             <a:endParaRPr lang="en-US" noProof="0" dirty="0"/>
           </a:p>
@@ -5122,7 +5207,7 @@
           <a:p>
             <a:fld id="{74929172-4BF7-429F-BA25-7E9D1A4215EE}" type="datetimeFigureOut">
               <a:rPr lang="en-US" noProof="0" smtClean="0"/>
-              <a:t>6/11/2019</a:t>
+              <a:t>6/13/2019</a:t>
             </a:fld>
             <a:endParaRPr lang="en-US" noProof="0" dirty="0"/>
           </a:p>
@@ -5410,7 +5495,7 @@
           <a:p>
             <a:fld id="{74929172-4BF7-429F-BA25-7E9D1A4215EE}" type="datetimeFigureOut">
               <a:rPr lang="en-US" noProof="0" smtClean="0"/>
-              <a:t>6/11/2019</a:t>
+              <a:t>6/13/2019</a:t>
             </a:fld>
             <a:endParaRPr lang="en-US" noProof="0" dirty="0"/>
           </a:p>
@@ -5738,7 +5823,7 @@
           <a:p>
             <a:fld id="{74929172-4BF7-429F-BA25-7E9D1A4215EE}" type="datetimeFigureOut">
               <a:rPr lang="en-US" noProof="0" smtClean="0"/>
-              <a:t>6/11/2019</a:t>
+              <a:t>6/13/2019</a:t>
             </a:fld>
             <a:endParaRPr lang="en-US" noProof="0" dirty="0"/>
           </a:p>
@@ -5950,7 +6035,7 @@
           <a:p>
             <a:fld id="{74929172-4BF7-429F-BA25-7E9D1A4215EE}" type="datetimeFigureOut">
               <a:rPr lang="en-US" noProof="0" smtClean="0"/>
-              <a:t>6/11/2019</a:t>
+              <a:t>6/13/2019</a:t>
             </a:fld>
             <a:endParaRPr lang="en-US" noProof="0" dirty="0"/>
           </a:p>
@@ -6541,7 +6626,7 @@
         </p:blipFill>
         <p:spPr>
           <a:xfrm>
-            <a:off x="921553" y="4644475"/>
+            <a:off x="921553" y="4679985"/>
             <a:ext cx="3314700" cy="952499"/>
           </a:xfrm>
           <a:prstGeom prst="rect">
@@ -6561,8 +6646,8 @@
         </p:nvSpPr>
         <p:spPr>
           <a:xfrm>
-            <a:off x="346230" y="408706"/>
-            <a:ext cx="3488924" cy="480424"/>
+            <a:off x="346229" y="408706"/>
+            <a:ext cx="3497801" cy="480424"/>
           </a:xfrm>
         </p:spPr>
         <p:txBody>
@@ -6578,7 +6663,7 @@
                   <a:schemeClr val="tx2"/>
                 </a:solidFill>
               </a:rPr>
-              <a:t>Organization CHART</a:t>
+              <a:t>Engineering roles</a:t>
             </a:r>
             <a:br>
               <a:rPr lang="en-US" sz="2800" dirty="0">
@@ -6588,12 +6673,12 @@
               </a:rPr>
             </a:br>
             <a:r>
-              <a:rPr lang="en-US" sz="2000" dirty="0">
-                <a:solidFill>
-                  <a:schemeClr val="tx2"/>
+              <a:rPr lang="en-US" sz="1800" dirty="0">
+                <a:solidFill>
+                  <a:srgbClr val="18276C"/>
                 </a:solidFill>
               </a:rPr>
-              <a:t>Engineering</a:t>
+              <a:t>2019-2020</a:t>
             </a:r>
             <a:endParaRPr lang="en-US" sz="2800" dirty="0">
               <a:solidFill>
@@ -6930,7 +7015,7 @@
                     <a:schemeClr val="tx1"/>
                   </a:solidFill>
                 </a:rPr>
-                <a:t>XXX</a:t>
+                <a:t>Thomas Collins</a:t>
               </a:r>
             </a:p>
           </p:txBody>
@@ -7137,14 +7222,50 @@
                   <a:spcPct val="35000"/>
                 </a:spcAft>
               </a:pPr>
+              <a:endParaRPr lang="en-US" sz="1200" dirty="0">
+                <a:solidFill>
+                  <a:schemeClr val="tx1"/>
+                </a:solidFill>
+              </a:endParaRPr>
+            </a:p>
+            <a:p>
+              <a:pPr algn="ctr" defTabSz="400050">
+                <a:lnSpc>
+                  <a:spcPct val="90000"/>
+                </a:lnSpc>
+                <a:spcBef>
+                  <a:spcPct val="0"/>
+                </a:spcBef>
+                <a:spcAft>
+                  <a:spcPct val="35000"/>
+                </a:spcAft>
+              </a:pPr>
               <a:r>
                 <a:rPr lang="en-US" sz="1200" dirty="0">
                   <a:solidFill>
                     <a:schemeClr val="tx1"/>
                   </a:solidFill>
                 </a:rPr>
-                <a:t>XXX</a:t>
+                <a:t>Megan Johnson</a:t>
               </a:r>
+            </a:p>
+            <a:p>
+              <a:pPr algn="ctr" defTabSz="400050">
+                <a:lnSpc>
+                  <a:spcPct val="90000"/>
+                </a:lnSpc>
+                <a:spcBef>
+                  <a:spcPct val="0"/>
+                </a:spcBef>
+                <a:spcAft>
+                  <a:spcPct val="35000"/>
+                </a:spcAft>
+              </a:pPr>
+              <a:endParaRPr lang="en-US" sz="1200" dirty="0">
+                <a:solidFill>
+                  <a:schemeClr val="tx1"/>
+                </a:solidFill>
+              </a:endParaRPr>
             </a:p>
           </p:txBody>
         </p:sp>
@@ -7368,7 +7489,7 @@
                     <a:schemeClr val="tx1"/>
                   </a:solidFill>
                 </a:rPr>
-                <a:t>XXX</a:t>
+                <a:t>Lucas Simmonds</a:t>
               </a:r>
             </a:p>
           </p:txBody>
@@ -7595,13 +7716,18 @@
                 <a:buNone/>
               </a:pPr>
               <a:r>
-                <a:rPr lang="en-US" sz="1200" kern="1200" dirty="0">
+                <a:rPr lang="en-US" sz="1200" dirty="0">
                   <a:solidFill>
                     <a:schemeClr val="tx1"/>
                   </a:solidFill>
                 </a:rPr>
-                <a:t>XXX</a:t>
+                <a:t>Silas Johnson</a:t>
               </a:r>
+              <a:endParaRPr lang="en-US" sz="1200" kern="1200" dirty="0">
+                <a:solidFill>
+                  <a:schemeClr val="tx1"/>
+                </a:solidFill>
+              </a:endParaRPr>
             </a:p>
           </p:txBody>
         </p:sp>
@@ -8682,8 +8808,21 @@
                     <a:prstClr val="black"/>
                   </a:solidFill>
                 </a:rPr>
-                <a:t>XXX</a:t>
+                <a:t>Zach </a:t>
               </a:r>
+              <a:r>
+                <a:rPr lang="en-US" sz="1200" dirty="0" err="1">
+                  <a:solidFill>
+                    <a:prstClr val="black"/>
+                  </a:solidFill>
+                </a:rPr>
+                <a:t>Raboin</a:t>
+              </a:r>
+              <a:endParaRPr lang="en-US" sz="1200" dirty="0">
+                <a:solidFill>
+                  <a:prstClr val="black"/>
+                </a:solidFill>
+              </a:endParaRPr>
             </a:p>
           </p:txBody>
         </p:sp>
@@ -9100,7 +9239,7 @@
                     <a:schemeClr val="tx1"/>
                   </a:solidFill>
                 </a:rPr>
-                <a:t>XXX</a:t>
+                <a:t>Tom Pham</a:t>
               </a:r>
             </a:p>
           </p:txBody>
@@ -9322,7 +9461,7 @@
                     <a:schemeClr val="tx1"/>
                   </a:solidFill>
                 </a:rPr>
-                <a:t>XXX</a:t>
+                <a:t>Ben Letourneau</a:t>
               </a:r>
             </a:p>
           </p:txBody>
@@ -9541,13 +9680,26 @@
                 <a:buNone/>
               </a:pPr>
               <a:r>
-                <a:rPr lang="en-US" sz="1200" kern="1200" dirty="0">
+                <a:rPr lang="en-US" sz="1200" dirty="0">
                   <a:solidFill>
                     <a:schemeClr val="tx1"/>
                   </a:solidFill>
                 </a:rPr>
-                <a:t>XXX</a:t>
+                <a:t>Carly </a:t>
               </a:r>
+              <a:r>
+                <a:rPr lang="en-US" sz="1200" dirty="0" err="1">
+                  <a:solidFill>
+                    <a:schemeClr val="tx1"/>
+                  </a:solidFill>
+                </a:rPr>
+                <a:t>Benik</a:t>
+              </a:r>
+              <a:endParaRPr lang="en-US" sz="1200" kern="1200" dirty="0">
+                <a:solidFill>
+                  <a:schemeClr val="tx1"/>
+                </a:solidFill>
+              </a:endParaRPr>
             </a:p>
           </p:txBody>
         </p:sp>
@@ -9815,7 +9967,7 @@
                     <a:prstClr val="black"/>
                   </a:solidFill>
                 </a:rPr>
-                <a:t>XXX</a:t>
+                <a:t>Ross Thyne</a:t>
               </a:r>
             </a:p>
           </p:txBody>
@@ -9909,437 +10061,6 @@
                 </a:spcAft>
               </a:pPr>
               <a:endParaRPr lang="en-US" sz="1000" dirty="0">
-                <a:solidFill>
-                  <a:schemeClr val="bg1"/>
-                </a:solidFill>
-              </a:endParaRPr>
-            </a:p>
-          </p:txBody>
-        </p:sp>
-      </p:grpSp>
-      <p:grpSp>
-        <p:nvGrpSpPr>
-          <p:cNvPr id="179" name="Group 178">
-            <a:extLst>
-              <a:ext uri="{FF2B5EF4-FFF2-40B4-BE49-F238E27FC236}">
-                <a16:creationId xmlns:a16="http://schemas.microsoft.com/office/drawing/2014/main" id="{CC8B84AE-F959-4D27-B8D2-82DCD9272296}"/>
-              </a:ext>
-              <a:ext uri="{C183D7F6-B498-43B3-948B-1728B52AA6E4}">
-                <adec:decorative xmlns:adec="http://schemas.microsoft.com/office/drawing/2017/decorative" val="1"/>
-              </a:ext>
-            </a:extLst>
-          </p:cNvPr>
-          <p:cNvGrpSpPr/>
-          <p:nvPr/>
-        </p:nvGrpSpPr>
-        <p:grpSpPr>
-          <a:xfrm>
-            <a:off x="5366001" y="3868160"/>
-            <a:ext cx="1389615" cy="544407"/>
-            <a:chOff x="6277476" y="3090121"/>
-            <a:chExt cx="1389615" cy="544407"/>
-          </a:xfrm>
-        </p:grpSpPr>
-        <p:sp>
-          <p:nvSpPr>
-            <p:cNvPr id="180" name="Rectangle 179">
-              <a:extLst>
-                <a:ext uri="{FF2B5EF4-FFF2-40B4-BE49-F238E27FC236}">
-                  <a16:creationId xmlns:a16="http://schemas.microsoft.com/office/drawing/2014/main" id="{A031E13D-DEFB-454B-AA65-CDEEC5B1C57A}"/>
-                </a:ext>
-              </a:extLst>
-            </p:cNvPr>
-            <p:cNvSpPr/>
-            <p:nvPr/>
-          </p:nvSpPr>
-          <p:spPr>
-            <a:xfrm>
-              <a:off x="6277476" y="3090121"/>
-              <a:ext cx="1368000" cy="509451"/>
-            </a:xfrm>
-            <a:prstGeom prst="rect">
-              <a:avLst/>
-            </a:prstGeom>
-            <a:solidFill>
-              <a:schemeClr val="bg1"/>
-            </a:solidFill>
-            <a:ln w="3175" cap="rnd" cmpd="sng" algn="ctr">
-              <a:solidFill>
-                <a:schemeClr val="bg1">
-                  <a:lumMod val="85000"/>
-                </a:schemeClr>
-              </a:solidFill>
-              <a:prstDash val="solid"/>
-            </a:ln>
-            <a:effectLst/>
-            <a:scene3d>
-              <a:camera prst="obliqueTopLeft"/>
-              <a:lightRig rig="soft" dir="t"/>
-            </a:scene3d>
-            <a:sp3d extrusionH="190500" prstMaterial="matte">
-              <a:contourClr>
-                <a:prstClr val="black">
-                  <a:lumMod val="50000"/>
-                  <a:lumOff val="50000"/>
-                </a:prstClr>
-              </a:contourClr>
-            </a:sp3d>
-          </p:spPr>
-          <p:style>
-            <a:lnRef idx="2">
-              <a:scrgbClr r="0" g="0" b="0"/>
-            </a:lnRef>
-            <a:fillRef idx="1">
-              <a:scrgbClr r="0" g="0" b="0"/>
-            </a:fillRef>
-            <a:effectRef idx="0">
-              <a:scrgbClr r="0" g="0" b="0"/>
-            </a:effectRef>
-            <a:fontRef idx="minor">
-              <a:schemeClr val="lt1"/>
-            </a:fontRef>
-          </p:style>
-          <p:txBody>
-            <a:bodyPr spcFirstLastPara="0" vert="horz" wrap="square" lIns="72000" tIns="5715" rIns="72000" bIns="54011" numCol="1" spcCol="1270" anchor="ctr" anchorCtr="0">
-              <a:noAutofit/>
-              <a:flatTx/>
-            </a:bodyPr>
-            <a:lstStyle/>
-            <a:p>
-              <a:pPr algn="ctr" defTabSz="400050">
-                <a:lnSpc>
-                  <a:spcPct val="90000"/>
-                </a:lnSpc>
-                <a:spcBef>
-                  <a:spcPct val="0"/>
-                </a:spcBef>
-                <a:spcAft>
-                  <a:spcPct val="35000"/>
-                </a:spcAft>
-              </a:pPr>
-              <a:r>
-                <a:rPr lang="en-US" sz="1200" dirty="0">
-                  <a:solidFill>
-                    <a:schemeClr val="tx1"/>
-                  </a:solidFill>
-                </a:rPr>
-                <a:t>XXX</a:t>
-              </a:r>
-            </a:p>
-          </p:txBody>
-        </p:sp>
-        <p:sp>
-          <p:nvSpPr>
-            <p:cNvPr id="181" name="Rectangle 180">
-              <a:extLst>
-                <a:ext uri="{FF2B5EF4-FFF2-40B4-BE49-F238E27FC236}">
-                  <a16:creationId xmlns:a16="http://schemas.microsoft.com/office/drawing/2014/main" id="{AB6E5748-E46C-43CE-996A-96D9D715C313}"/>
-                </a:ext>
-              </a:extLst>
-            </p:cNvPr>
-            <p:cNvSpPr/>
-            <p:nvPr/>
-          </p:nvSpPr>
-          <p:spPr>
-            <a:xfrm>
-              <a:off x="6299091" y="3526528"/>
-              <a:ext cx="1368000" cy="108000"/>
-            </a:xfrm>
-            <a:prstGeom prst="rect">
-              <a:avLst/>
-            </a:prstGeom>
-            <a:solidFill>
-              <a:srgbClr val="00B050"/>
-            </a:solidFill>
-            <a:ln>
-              <a:noFill/>
-            </a:ln>
-            <a:effectLst>
-              <a:glow rad="254000">
-                <a:schemeClr val="accent6">
-                  <a:satMod val="175000"/>
-                  <a:alpha val="10000"/>
-                </a:schemeClr>
-              </a:glow>
-            </a:effectLst>
-            <a:scene3d>
-              <a:camera prst="obliqueTopLeft"/>
-              <a:lightRig rig="brightRoom" dir="t"/>
-            </a:scene3d>
-            <a:sp3d extrusionH="88900"/>
-          </p:spPr>
-          <p:style>
-            <a:lnRef idx="2">
-              <a:schemeClr val="accent1">
-                <a:hueOff val="0"/>
-                <a:satOff val="0"/>
-                <a:lumOff val="0"/>
-                <a:alphaOff val="0"/>
-              </a:schemeClr>
-            </a:lnRef>
-            <a:fillRef idx="1">
-              <a:scrgbClr r="0" g="0" b="0"/>
-            </a:fillRef>
-            <a:effectRef idx="0">
-              <a:schemeClr val="lt1">
-                <a:alpha val="90000"/>
-                <a:hueOff val="0"/>
-                <a:satOff val="0"/>
-                <a:lumOff val="0"/>
-                <a:alphaOff val="0"/>
-              </a:schemeClr>
-            </a:effectRef>
-            <a:fontRef idx="minor">
-              <a:schemeClr val="dk1">
-                <a:hueOff val="0"/>
-                <a:satOff val="0"/>
-                <a:lumOff val="0"/>
-                <a:alphaOff val="0"/>
-              </a:schemeClr>
-            </a:fontRef>
-          </p:style>
-          <p:txBody>
-            <a:bodyPr spcFirstLastPara="0" vert="horz" wrap="square" lIns="72000" tIns="5715" rIns="72000" bIns="5715" numCol="1" spcCol="1270" anchor="ctr" anchorCtr="0">
-              <a:noAutofit/>
-              <a:flatTx/>
-            </a:bodyPr>
-            <a:lstStyle/>
-            <a:p>
-              <a:pPr algn="ctr" defTabSz="400050">
-                <a:lnSpc>
-                  <a:spcPct val="90000"/>
-                </a:lnSpc>
-                <a:spcBef>
-                  <a:spcPct val="0"/>
-                </a:spcBef>
-                <a:spcAft>
-                  <a:spcPct val="35000"/>
-                </a:spcAft>
-              </a:pPr>
-              <a:endParaRPr lang="en-US" sz="1000" dirty="0">
-                <a:solidFill>
-                  <a:schemeClr val="bg1"/>
-                </a:solidFill>
-              </a:endParaRPr>
-            </a:p>
-          </p:txBody>
-        </p:sp>
-      </p:grpSp>
-      <p:grpSp>
-        <p:nvGrpSpPr>
-          <p:cNvPr id="182" name="Group 181">
-            <a:extLst>
-              <a:ext uri="{FF2B5EF4-FFF2-40B4-BE49-F238E27FC236}">
-                <a16:creationId xmlns:a16="http://schemas.microsoft.com/office/drawing/2014/main" id="{BA7EFFA3-298D-4F34-96BC-6593A2BCD11C}"/>
-              </a:ext>
-              <a:ext uri="{C183D7F6-B498-43B3-948B-1728B52AA6E4}">
-                <adec:decorative xmlns:adec="http://schemas.microsoft.com/office/drawing/2017/decorative" val="1"/>
-              </a:ext>
-            </a:extLst>
-          </p:cNvPr>
-          <p:cNvGrpSpPr/>
-          <p:nvPr/>
-        </p:nvGrpSpPr>
-        <p:grpSpPr>
-          <a:xfrm>
-            <a:off x="7099350" y="3868160"/>
-            <a:ext cx="1386544" cy="544407"/>
-            <a:chOff x="8010825" y="3090121"/>
-            <a:chExt cx="1386544" cy="544407"/>
-          </a:xfrm>
-        </p:grpSpPr>
-        <p:sp>
-          <p:nvSpPr>
-            <p:cNvPr id="183" name="Rectangle 182">
-              <a:extLst>
-                <a:ext uri="{FF2B5EF4-FFF2-40B4-BE49-F238E27FC236}">
-                  <a16:creationId xmlns:a16="http://schemas.microsoft.com/office/drawing/2014/main" id="{6B029B69-CBFA-4EDC-B969-E843640AC3C7}"/>
-                </a:ext>
-              </a:extLst>
-            </p:cNvPr>
-            <p:cNvSpPr/>
-            <p:nvPr/>
-          </p:nvSpPr>
-          <p:spPr>
-            <a:xfrm>
-              <a:off x="8010825" y="3090121"/>
-              <a:ext cx="1368000" cy="509451"/>
-            </a:xfrm>
-            <a:prstGeom prst="rect">
-              <a:avLst/>
-            </a:prstGeom>
-            <a:gradFill>
-              <a:gsLst>
-                <a:gs pos="0">
-                  <a:schemeClr val="bg1"/>
-                </a:gs>
-                <a:gs pos="100000">
-                  <a:schemeClr val="bg1">
-                    <a:lumMod val="85000"/>
-                  </a:schemeClr>
-                </a:gs>
-              </a:gsLst>
-              <a:lin ang="5400000" scaled="0"/>
-            </a:gradFill>
-            <a:ln w="3175">
-              <a:solidFill>
-                <a:schemeClr val="bg1">
-                  <a:lumMod val="85000"/>
-                </a:schemeClr>
-              </a:solidFill>
-            </a:ln>
-            <a:effectLst/>
-            <a:scene3d>
-              <a:camera prst="obliqueTopLeft"/>
-              <a:lightRig rig="soft" dir="t"/>
-            </a:scene3d>
-            <a:sp3d extrusionH="190500" prstMaterial="matte">
-              <a:contourClr>
-                <a:schemeClr val="tx1">
-                  <a:lumMod val="50000"/>
-                  <a:lumOff val="50000"/>
-                </a:schemeClr>
-              </a:contourClr>
-            </a:sp3d>
-          </p:spPr>
-          <p:style>
-            <a:lnRef idx="2">
-              <a:scrgbClr r="0" g="0" b="0"/>
-            </a:lnRef>
-            <a:fillRef idx="1">
-              <a:scrgbClr r="0" g="0" b="0"/>
-            </a:fillRef>
-            <a:effectRef idx="0">
-              <a:schemeClr val="accent1">
-                <a:hueOff val="0"/>
-                <a:satOff val="0"/>
-                <a:lumOff val="0"/>
-                <a:alphaOff val="0"/>
-              </a:schemeClr>
-            </a:effectRef>
-            <a:fontRef idx="minor">
-              <a:schemeClr val="lt1"/>
-            </a:fontRef>
-          </p:style>
-          <p:txBody>
-            <a:bodyPr spcFirstLastPara="0" vert="horz" wrap="square" lIns="72000" tIns="5715" rIns="72000" bIns="54011" numCol="1" spcCol="1270" anchor="ctr" anchorCtr="0">
-              <a:noAutofit/>
-              <a:flatTx/>
-            </a:bodyPr>
-            <a:lstStyle/>
-            <a:p>
-              <a:pPr algn="ctr" defTabSz="400050">
-                <a:lnSpc>
-                  <a:spcPct val="90000"/>
-                </a:lnSpc>
-                <a:spcBef>
-                  <a:spcPct val="0"/>
-                </a:spcBef>
-                <a:spcAft>
-                  <a:spcPct val="35000"/>
-                </a:spcAft>
-              </a:pPr>
-              <a:r>
-                <a:rPr lang="en-US" sz="1200" dirty="0">
-                  <a:solidFill>
-                    <a:schemeClr val="tx1"/>
-                  </a:solidFill>
-                </a:rPr>
-                <a:t>XXX</a:t>
-              </a:r>
-            </a:p>
-          </p:txBody>
-        </p:sp>
-        <p:sp>
-          <p:nvSpPr>
-            <p:cNvPr id="184" name="Rectangle 183">
-              <a:extLst>
-                <a:ext uri="{FF2B5EF4-FFF2-40B4-BE49-F238E27FC236}">
-                  <a16:creationId xmlns:a16="http://schemas.microsoft.com/office/drawing/2014/main" id="{AB07B4EA-33FC-4519-9EF8-8858871C9BF8}"/>
-                </a:ext>
-              </a:extLst>
-            </p:cNvPr>
-            <p:cNvSpPr/>
-            <p:nvPr/>
-          </p:nvSpPr>
-          <p:spPr>
-            <a:xfrm>
-              <a:off x="8029369" y="3526528"/>
-              <a:ext cx="1368000" cy="108000"/>
-            </a:xfrm>
-            <a:prstGeom prst="rect">
-              <a:avLst/>
-            </a:prstGeom>
-            <a:solidFill>
-              <a:srgbClr val="0070C0"/>
-            </a:solidFill>
-            <a:ln>
-              <a:noFill/>
-            </a:ln>
-            <a:effectLst>
-              <a:glow rad="254000">
-                <a:schemeClr val="accent6">
-                  <a:satMod val="175000"/>
-                  <a:alpha val="10000"/>
-                </a:schemeClr>
-              </a:glow>
-            </a:effectLst>
-            <a:scene3d>
-              <a:camera prst="obliqueTopLeft"/>
-              <a:lightRig rig="brightRoom" dir="t"/>
-            </a:scene3d>
-            <a:sp3d extrusionH="88900"/>
-          </p:spPr>
-          <p:style>
-            <a:lnRef idx="2">
-              <a:schemeClr val="accent1">
-                <a:hueOff val="0"/>
-                <a:satOff val="0"/>
-                <a:lumOff val="0"/>
-                <a:alphaOff val="0"/>
-              </a:schemeClr>
-            </a:lnRef>
-            <a:fillRef idx="1">
-              <a:scrgbClr r="0" g="0" b="0"/>
-            </a:fillRef>
-            <a:effectRef idx="0">
-              <a:schemeClr val="lt1">
-                <a:alpha val="90000"/>
-                <a:hueOff val="0"/>
-                <a:satOff val="0"/>
-                <a:lumOff val="0"/>
-                <a:alphaOff val="0"/>
-              </a:schemeClr>
-            </a:effectRef>
-            <a:fontRef idx="minor">
-              <a:schemeClr val="dk1">
-                <a:hueOff val="0"/>
-                <a:satOff val="0"/>
-                <a:lumOff val="0"/>
-                <a:alphaOff val="0"/>
-              </a:schemeClr>
-            </a:fontRef>
-          </p:style>
-          <p:txBody>
-            <a:bodyPr spcFirstLastPara="0" vert="horz" wrap="square" lIns="72000" tIns="0" rIns="72000" bIns="5715" numCol="1" spcCol="1270" anchor="ctr" anchorCtr="0">
-              <a:noAutofit/>
-              <a:flatTx/>
-            </a:bodyPr>
-            <a:lstStyle/>
-            <a:p>
-              <a:pPr marL="0" lvl="0" indent="0" algn="ctr" defTabSz="400050">
-                <a:lnSpc>
-                  <a:spcPct val="90000"/>
-                </a:lnSpc>
-                <a:spcBef>
-                  <a:spcPct val="0"/>
-                </a:spcBef>
-                <a:spcAft>
-                  <a:spcPct val="35000"/>
-                </a:spcAft>
-                <a:buNone/>
-              </a:pPr>
-              <a:endParaRPr lang="en-US" sz="1000" kern="1200" dirty="0">
                 <a:solidFill>
                   <a:schemeClr val="bg1"/>
                 </a:solidFill>
@@ -10566,7 +10287,10 @@
               <a:avLst/>
             </a:prstGeom>
             <a:solidFill>
-              <a:schemeClr val="accent5"/>
+              <a:schemeClr val="accent5">
+                <a:lumMod val="60000"/>
+                <a:lumOff val="40000"/>
+              </a:schemeClr>
             </a:solidFill>
             <a:ln>
               <a:noFill/>
@@ -11426,10 +11150,2594 @@
           </a:p>
         </p:txBody>
       </p:sp>
+      <p:sp>
+        <p:nvSpPr>
+          <p:cNvPr id="2" name="TextBox 1">
+            <a:extLst>
+              <a:ext uri="{FF2B5EF4-FFF2-40B4-BE49-F238E27FC236}">
+                <a16:creationId xmlns:a16="http://schemas.microsoft.com/office/drawing/2014/main" id="{0133B574-FFD8-4794-8D06-074170AD9E84}"/>
+              </a:ext>
+            </a:extLst>
+          </p:cNvPr>
+          <p:cNvSpPr txBox="1"/>
+          <p:nvPr/>
+        </p:nvSpPr>
+        <p:spPr>
+          <a:xfrm>
+            <a:off x="10369118" y="1257442"/>
+            <a:ext cx="1620019" cy="1938992"/>
+          </a:xfrm>
+          <a:prstGeom prst="rect">
+            <a:avLst/>
+          </a:prstGeom>
+          <a:noFill/>
+        </p:spPr>
+        <p:txBody>
+          <a:bodyPr wrap="square" rtlCol="0">
+            <a:spAutoFit/>
+          </a:bodyPr>
+          <a:lstStyle/>
+          <a:p>
+            <a:pPr algn="r"/>
+            <a:r>
+              <a:rPr lang="en-US" sz="1200" dirty="0"/>
+              <a:t>Charlie Nitschelm - ME</a:t>
+            </a:r>
+          </a:p>
+          <a:p>
+            <a:pPr algn="r"/>
+            <a:r>
+              <a:rPr lang="en-US" sz="1200" dirty="0"/>
+              <a:t>Thomas Collins - ME</a:t>
+            </a:r>
+          </a:p>
+          <a:p>
+            <a:pPr algn="r"/>
+            <a:r>
+              <a:rPr lang="en-US" sz="1200" dirty="0"/>
+              <a:t>Silas Johnson - ME</a:t>
+            </a:r>
+          </a:p>
+          <a:p>
+            <a:pPr algn="r"/>
+            <a:r>
+              <a:rPr lang="en-US" sz="1200" dirty="0"/>
+              <a:t>Ben </a:t>
+            </a:r>
+            <a:r>
+              <a:rPr lang="en-US" sz="1200" dirty="0" err="1"/>
+              <a:t>Letoureau</a:t>
+            </a:r>
+            <a:r>
+              <a:rPr lang="en-US" sz="1200" dirty="0"/>
+              <a:t> - EE</a:t>
+            </a:r>
+          </a:p>
+          <a:p>
+            <a:pPr algn="r"/>
+            <a:r>
+              <a:rPr lang="en-US" sz="1200" dirty="0"/>
+              <a:t>Lucas Simmonds - ME</a:t>
+            </a:r>
+          </a:p>
+          <a:p>
+            <a:pPr algn="r"/>
+            <a:r>
+              <a:rPr lang="en-US" sz="1200" dirty="0"/>
+              <a:t>Carly </a:t>
+            </a:r>
+            <a:r>
+              <a:rPr lang="en-US" sz="1200" dirty="0" err="1"/>
+              <a:t>Benik</a:t>
+            </a:r>
+            <a:r>
+              <a:rPr lang="en-US" sz="1200" dirty="0"/>
+              <a:t> – ME</a:t>
+            </a:r>
+          </a:p>
+          <a:p>
+            <a:pPr algn="r"/>
+            <a:r>
+              <a:rPr lang="en-US" sz="1200" dirty="0"/>
+              <a:t>Megan Johnson - EE</a:t>
+            </a:r>
+          </a:p>
+          <a:p>
+            <a:pPr algn="r"/>
+            <a:r>
+              <a:rPr lang="en-US" sz="1200" dirty="0"/>
+              <a:t>Ross Thyne - ME</a:t>
+            </a:r>
+          </a:p>
+          <a:p>
+            <a:pPr algn="r"/>
+            <a:r>
+              <a:rPr lang="en-US" sz="1200" dirty="0"/>
+              <a:t>Thomas Pham - EE</a:t>
+            </a:r>
+          </a:p>
+          <a:p>
+            <a:pPr algn="r"/>
+            <a:r>
+              <a:rPr lang="en-US" sz="1200" dirty="0"/>
+              <a:t>Zach </a:t>
+            </a:r>
+            <a:r>
+              <a:rPr lang="en-US" sz="1200" dirty="0" err="1"/>
+              <a:t>Raboin</a:t>
+            </a:r>
+            <a:r>
+              <a:rPr lang="en-US" sz="1200" dirty="0"/>
+              <a:t> – ME</a:t>
+            </a:r>
+          </a:p>
+        </p:txBody>
+      </p:sp>
+      <p:grpSp>
+        <p:nvGrpSpPr>
+          <p:cNvPr id="88" name="Group 87">
+            <a:extLst>
+              <a:ext uri="{FF2B5EF4-FFF2-40B4-BE49-F238E27FC236}">
+                <a16:creationId xmlns:a16="http://schemas.microsoft.com/office/drawing/2014/main" id="{2D70E445-1CE6-40B6-9F13-53392531CDD7}"/>
+              </a:ext>
+              <a:ext uri="{C183D7F6-B498-43B3-948B-1728B52AA6E4}">
+                <adec:decorative xmlns:adec="http://schemas.microsoft.com/office/drawing/2017/decorative" val="1"/>
+              </a:ext>
+            </a:extLst>
+          </p:cNvPr>
+          <p:cNvGrpSpPr/>
+          <p:nvPr/>
+        </p:nvGrpSpPr>
+        <p:grpSpPr>
+          <a:xfrm>
+            <a:off x="5363012" y="3860110"/>
+            <a:ext cx="1389615" cy="544407"/>
+            <a:chOff x="6277476" y="3090121"/>
+            <a:chExt cx="1389615" cy="544407"/>
+          </a:xfrm>
+        </p:grpSpPr>
+        <p:sp>
+          <p:nvSpPr>
+            <p:cNvPr id="91" name="Rectangle 90">
+              <a:extLst>
+                <a:ext uri="{FF2B5EF4-FFF2-40B4-BE49-F238E27FC236}">
+                  <a16:creationId xmlns:a16="http://schemas.microsoft.com/office/drawing/2014/main" id="{5008728E-A191-4CA9-8F9E-A0B99B98F775}"/>
+                </a:ext>
+              </a:extLst>
+            </p:cNvPr>
+            <p:cNvSpPr/>
+            <p:nvPr/>
+          </p:nvSpPr>
+          <p:spPr>
+            <a:xfrm>
+              <a:off x="6277476" y="3090121"/>
+              <a:ext cx="1368000" cy="509451"/>
+            </a:xfrm>
+            <a:prstGeom prst="rect">
+              <a:avLst/>
+            </a:prstGeom>
+            <a:solidFill>
+              <a:schemeClr val="bg1"/>
+            </a:solidFill>
+            <a:ln w="3175" cap="rnd" cmpd="sng" algn="ctr">
+              <a:solidFill>
+                <a:schemeClr val="bg1">
+                  <a:lumMod val="85000"/>
+                </a:schemeClr>
+              </a:solidFill>
+              <a:prstDash val="solid"/>
+            </a:ln>
+            <a:effectLst/>
+            <a:scene3d>
+              <a:camera prst="obliqueTopLeft"/>
+              <a:lightRig rig="soft" dir="t"/>
+            </a:scene3d>
+            <a:sp3d extrusionH="190500" prstMaterial="matte">
+              <a:contourClr>
+                <a:prstClr val="black">
+                  <a:lumMod val="50000"/>
+                  <a:lumOff val="50000"/>
+                </a:prstClr>
+              </a:contourClr>
+            </a:sp3d>
+          </p:spPr>
+          <p:style>
+            <a:lnRef idx="2">
+              <a:scrgbClr r="0" g="0" b="0"/>
+            </a:lnRef>
+            <a:fillRef idx="1">
+              <a:scrgbClr r="0" g="0" b="0"/>
+            </a:fillRef>
+            <a:effectRef idx="0">
+              <a:scrgbClr r="0" g="0" b="0"/>
+            </a:effectRef>
+            <a:fontRef idx="minor">
+              <a:schemeClr val="lt1"/>
+            </a:fontRef>
+          </p:style>
+          <p:txBody>
+            <a:bodyPr spcFirstLastPara="0" vert="horz" wrap="square" lIns="72000" tIns="5715" rIns="72000" bIns="54011" numCol="1" spcCol="1270" anchor="ctr" anchorCtr="0">
+              <a:noAutofit/>
+              <a:flatTx/>
+            </a:bodyPr>
+            <a:lstStyle/>
+            <a:p>
+              <a:pPr algn="ctr" defTabSz="400050">
+                <a:lnSpc>
+                  <a:spcPct val="90000"/>
+                </a:lnSpc>
+                <a:spcBef>
+                  <a:spcPct val="0"/>
+                </a:spcBef>
+                <a:spcAft>
+                  <a:spcPct val="35000"/>
+                </a:spcAft>
+              </a:pPr>
+              <a:endParaRPr lang="en-US" sz="1200" dirty="0">
+                <a:solidFill>
+                  <a:schemeClr val="tx1"/>
+                </a:solidFill>
+              </a:endParaRPr>
+            </a:p>
+          </p:txBody>
+        </p:sp>
+        <p:sp>
+          <p:nvSpPr>
+            <p:cNvPr id="92" name="Rectangle 91">
+              <a:extLst>
+                <a:ext uri="{FF2B5EF4-FFF2-40B4-BE49-F238E27FC236}">
+                  <a16:creationId xmlns:a16="http://schemas.microsoft.com/office/drawing/2014/main" id="{9D79E768-D515-4918-9B3D-997710857C17}"/>
+                </a:ext>
+              </a:extLst>
+            </p:cNvPr>
+            <p:cNvSpPr/>
+            <p:nvPr/>
+          </p:nvSpPr>
+          <p:spPr>
+            <a:xfrm>
+              <a:off x="6299091" y="3526528"/>
+              <a:ext cx="1368000" cy="108000"/>
+            </a:xfrm>
+            <a:prstGeom prst="rect">
+              <a:avLst/>
+            </a:prstGeom>
+            <a:solidFill>
+              <a:srgbClr val="00B050"/>
+            </a:solidFill>
+            <a:ln>
+              <a:noFill/>
+            </a:ln>
+            <a:effectLst>
+              <a:glow rad="254000">
+                <a:schemeClr val="accent6">
+                  <a:satMod val="175000"/>
+                  <a:alpha val="10000"/>
+                </a:schemeClr>
+              </a:glow>
+            </a:effectLst>
+            <a:scene3d>
+              <a:camera prst="obliqueTopLeft"/>
+              <a:lightRig rig="brightRoom" dir="t"/>
+            </a:scene3d>
+            <a:sp3d extrusionH="88900"/>
+          </p:spPr>
+          <p:style>
+            <a:lnRef idx="2">
+              <a:schemeClr val="accent1">
+                <a:hueOff val="0"/>
+                <a:satOff val="0"/>
+                <a:lumOff val="0"/>
+                <a:alphaOff val="0"/>
+              </a:schemeClr>
+            </a:lnRef>
+            <a:fillRef idx="1">
+              <a:scrgbClr r="0" g="0" b="0"/>
+            </a:fillRef>
+            <a:effectRef idx="0">
+              <a:schemeClr val="lt1">
+                <a:alpha val="90000"/>
+                <a:hueOff val="0"/>
+                <a:satOff val="0"/>
+                <a:lumOff val="0"/>
+                <a:alphaOff val="0"/>
+              </a:schemeClr>
+            </a:effectRef>
+            <a:fontRef idx="minor">
+              <a:schemeClr val="dk1">
+                <a:hueOff val="0"/>
+                <a:satOff val="0"/>
+                <a:lumOff val="0"/>
+                <a:alphaOff val="0"/>
+              </a:schemeClr>
+            </a:fontRef>
+          </p:style>
+          <p:txBody>
+            <a:bodyPr spcFirstLastPara="0" vert="horz" wrap="square" lIns="72000" tIns="5715" rIns="72000" bIns="5715" numCol="1" spcCol="1270" anchor="ctr" anchorCtr="0">
+              <a:noAutofit/>
+              <a:flatTx/>
+            </a:bodyPr>
+            <a:lstStyle/>
+            <a:p>
+              <a:pPr algn="ctr" defTabSz="400050">
+                <a:lnSpc>
+                  <a:spcPct val="90000"/>
+                </a:lnSpc>
+                <a:spcBef>
+                  <a:spcPct val="0"/>
+                </a:spcBef>
+                <a:spcAft>
+                  <a:spcPct val="35000"/>
+                </a:spcAft>
+              </a:pPr>
+              <a:endParaRPr lang="en-US" sz="1000" dirty="0">
+                <a:solidFill>
+                  <a:schemeClr val="bg1"/>
+                </a:solidFill>
+              </a:endParaRPr>
+            </a:p>
+          </p:txBody>
+        </p:sp>
+      </p:grpSp>
+      <p:sp>
+        <p:nvSpPr>
+          <p:cNvPr id="3" name="TextBox 2">
+            <a:extLst>
+              <a:ext uri="{FF2B5EF4-FFF2-40B4-BE49-F238E27FC236}">
+                <a16:creationId xmlns:a16="http://schemas.microsoft.com/office/drawing/2014/main" id="{E02E875E-D893-4978-B9F1-C25A975EA4BA}"/>
+              </a:ext>
+            </a:extLst>
+          </p:cNvPr>
+          <p:cNvSpPr txBox="1"/>
+          <p:nvPr/>
+        </p:nvSpPr>
+        <p:spPr>
+          <a:xfrm>
+            <a:off x="5586365" y="2838319"/>
+            <a:ext cx="850782" cy="270920"/>
+          </a:xfrm>
+          <a:prstGeom prst="rect">
+            <a:avLst/>
+          </a:prstGeom>
+          <a:noFill/>
+        </p:spPr>
+        <p:txBody>
+          <a:bodyPr wrap="square" rtlCol="0">
+            <a:spAutoFit/>
+          </a:bodyPr>
+          <a:lstStyle/>
+          <a:p>
+            <a:r>
+              <a:rPr lang="en-US" sz="1100" dirty="0"/>
+              <a:t>Needs 2 EE</a:t>
+            </a:r>
+          </a:p>
+        </p:txBody>
+      </p:sp>
+      <p:sp>
+        <p:nvSpPr>
+          <p:cNvPr id="93" name="TextBox 92">
+            <a:extLst>
+              <a:ext uri="{FF2B5EF4-FFF2-40B4-BE49-F238E27FC236}">
+                <a16:creationId xmlns:a16="http://schemas.microsoft.com/office/drawing/2014/main" id="{B65FEDAD-7EC7-4593-BA09-2653916DC8C6}"/>
+              </a:ext>
+            </a:extLst>
+          </p:cNvPr>
+          <p:cNvSpPr txBox="1"/>
+          <p:nvPr/>
+        </p:nvSpPr>
+        <p:spPr>
+          <a:xfrm>
+            <a:off x="7357570" y="2808495"/>
+            <a:ext cx="850782" cy="270920"/>
+          </a:xfrm>
+          <a:prstGeom prst="rect">
+            <a:avLst/>
+          </a:prstGeom>
+          <a:noFill/>
+        </p:spPr>
+        <p:txBody>
+          <a:bodyPr wrap="square" rtlCol="0">
+            <a:spAutoFit/>
+          </a:bodyPr>
+          <a:lstStyle/>
+          <a:p>
+            <a:r>
+              <a:rPr lang="en-US" sz="1100" dirty="0"/>
+              <a:t>Needs 1 EE</a:t>
+            </a:r>
+          </a:p>
+        </p:txBody>
+      </p:sp>
+      <p:sp>
+        <p:nvSpPr>
+          <p:cNvPr id="5" name="TextBox 4">
+            <a:extLst>
+              <a:ext uri="{FF2B5EF4-FFF2-40B4-BE49-F238E27FC236}">
+                <a16:creationId xmlns:a16="http://schemas.microsoft.com/office/drawing/2014/main" id="{37DDF8CE-E2A5-4DAF-A10C-C77DF6FD670B}"/>
+              </a:ext>
+            </a:extLst>
+          </p:cNvPr>
+          <p:cNvSpPr txBox="1"/>
+          <p:nvPr/>
+        </p:nvSpPr>
+        <p:spPr>
+          <a:xfrm>
+            <a:off x="5586365" y="129735"/>
+            <a:ext cx="1466878" cy="369332"/>
+          </a:xfrm>
+          <a:prstGeom prst="rect">
+            <a:avLst/>
+          </a:prstGeom>
+          <a:noFill/>
+        </p:spPr>
+        <p:txBody>
+          <a:bodyPr wrap="square" rtlCol="0">
+            <a:spAutoFit/>
+          </a:bodyPr>
+          <a:lstStyle/>
+          <a:p>
+            <a:r>
+              <a:rPr lang="en-US" dirty="0"/>
+              <a:t>GRACE</a:t>
+            </a:r>
+          </a:p>
+        </p:txBody>
+      </p:sp>
     </p:spTree>
     <p:extLst>
       <p:ext uri="{BB962C8B-B14F-4D97-AF65-F5344CB8AC3E}">
         <p14:creationId xmlns:p14="http://schemas.microsoft.com/office/powerpoint/2010/main" val="4193948799"/>
+      </p:ext>
+    </p:extLst>
+  </p:cSld>
+  <p:clrMapOvr>
+    <a:overrideClrMapping bg1="lt1" tx1="dk1" bg2="lt2" tx2="dk2" accent1="accent1" accent2="accent2" accent3="accent3" accent4="accent4" accent5="accent5" accent6="accent6" hlink="hlink" folHlink="folHlink"/>
+  </p:clrMapOvr>
+</p:sld>
+</file>
+
+<file path=ppt/slides/slide2.xml><?xml version="1.0" encoding="utf-8"?>
+<p:sld xmlns:a="http://schemas.openxmlformats.org/drawingml/2006/main" xmlns:r="http://schemas.openxmlformats.org/officeDocument/2006/relationships" xmlns:p="http://schemas.openxmlformats.org/presentationml/2006/main">
+  <p:cSld>
+    <p:bg>
+      <p:bgPr>
+        <a:gradFill flip="none" rotWithShape="1">
+          <a:gsLst>
+            <a:gs pos="0">
+              <a:schemeClr val="bg1">
+                <a:lumMod val="85000"/>
+              </a:schemeClr>
+            </a:gs>
+            <a:gs pos="100000">
+              <a:schemeClr val="bg1">
+                <a:lumMod val="95000"/>
+              </a:schemeClr>
+            </a:gs>
+          </a:gsLst>
+          <a:lin ang="13500000" scaled="1"/>
+          <a:tileRect/>
+        </a:gradFill>
+        <a:effectLst/>
+      </p:bgPr>
+    </p:bg>
+    <p:spTree>
+      <p:nvGrpSpPr>
+        <p:cNvPr id="1" name=""/>
+        <p:cNvGrpSpPr/>
+        <p:nvPr/>
+      </p:nvGrpSpPr>
+      <p:grpSpPr>
+        <a:xfrm>
+          <a:off x="0" y="0"/>
+          <a:ext cx="0" cy="0"/>
+          <a:chOff x="0" y="0"/>
+          <a:chExt cx="0" cy="0"/>
+        </a:xfrm>
+      </p:grpSpPr>
+      <p:sp>
+        <p:nvSpPr>
+          <p:cNvPr id="4" name="Title 3" descr="decorative element"/>
+          <p:cNvSpPr>
+            <a:spLocks noGrp="1"/>
+          </p:cNvSpPr>
+          <p:nvPr>
+            <p:ph type="title"/>
+          </p:nvPr>
+        </p:nvSpPr>
+        <p:spPr>
+          <a:xfrm>
+            <a:off x="346229" y="408706"/>
+            <a:ext cx="3497801" cy="480424"/>
+          </a:xfrm>
+        </p:spPr>
+        <p:txBody>
+          <a:bodyPr>
+            <a:noAutofit/>
+          </a:bodyPr>
+          <a:lstStyle/>
+          <a:p>
+            <a:pPr algn="ctr"/>
+            <a:r>
+              <a:rPr lang="en-US" sz="2800" dirty="0">
+                <a:solidFill>
+                  <a:schemeClr val="tx2"/>
+                </a:solidFill>
+              </a:rPr>
+              <a:t>Engineering goals</a:t>
+            </a:r>
+            <a:br>
+              <a:rPr lang="en-US" sz="2800" dirty="0">
+                <a:solidFill>
+                  <a:schemeClr val="tx2"/>
+                </a:solidFill>
+              </a:rPr>
+            </a:br>
+            <a:r>
+              <a:rPr lang="en-US" sz="1800" dirty="0">
+                <a:solidFill>
+                  <a:schemeClr val="tx2"/>
+                </a:solidFill>
+              </a:rPr>
+              <a:t>2019-2020</a:t>
+            </a:r>
+            <a:endParaRPr lang="en-US" sz="2800" dirty="0">
+              <a:solidFill>
+                <a:schemeClr val="tx2"/>
+              </a:solidFill>
+            </a:endParaRPr>
+          </a:p>
+        </p:txBody>
+      </p:sp>
+      <p:sp>
+        <p:nvSpPr>
+          <p:cNvPr id="203" name="Title 3" descr="decorative element">
+            <a:extLst>
+              <a:ext uri="{FF2B5EF4-FFF2-40B4-BE49-F238E27FC236}">
+                <a16:creationId xmlns:a16="http://schemas.microsoft.com/office/drawing/2014/main" id="{09C8FC4F-5DB3-460E-9526-FACC1D975BC7}"/>
+              </a:ext>
+            </a:extLst>
+          </p:cNvPr>
+          <p:cNvSpPr txBox="1">
+            <a:spLocks/>
+          </p:cNvSpPr>
+          <p:nvPr/>
+        </p:nvSpPr>
+        <p:spPr>
+          <a:xfrm>
+            <a:off x="10255323" y="6205964"/>
+            <a:ext cx="1705993" cy="480424"/>
+          </a:xfrm>
+          <a:prstGeom prst="rect">
+            <a:avLst/>
+          </a:prstGeom>
+          <a:effectLst/>
+        </p:spPr>
+        <p:txBody>
+          <a:bodyPr vert="horz" lIns="91440" tIns="45720" rIns="91440" bIns="45720" rtlCol="0" anchor="ctr">
+            <a:noAutofit/>
+          </a:bodyPr>
+          <a:lstStyle>
+            <a:lvl1pPr algn="l" defTabSz="457200" rtl="0" eaLnBrk="1" latinLnBrk="0" hangingPunct="1">
+              <a:spcBef>
+                <a:spcPct val="0"/>
+              </a:spcBef>
+              <a:buNone/>
+              <a:defRPr sz="3600" kern="1200" cap="all">
+                <a:ln w="3175" cmpd="sng">
+                  <a:noFill/>
+                </a:ln>
+                <a:solidFill>
+                  <a:schemeClr val="tx1"/>
+                </a:solidFill>
+                <a:effectLst/>
+                <a:latin typeface="+mj-lt"/>
+                <a:ea typeface="+mj-ea"/>
+                <a:cs typeface="+mj-cs"/>
+              </a:defRPr>
+            </a:lvl1pPr>
+            <a:lvl2pPr eaLnBrk="1" hangingPunct="1">
+              <a:defRPr>
+                <a:solidFill>
+                  <a:schemeClr val="tx2"/>
+                </a:solidFill>
+              </a:defRPr>
+            </a:lvl2pPr>
+            <a:lvl3pPr eaLnBrk="1" hangingPunct="1">
+              <a:defRPr>
+                <a:solidFill>
+                  <a:schemeClr val="tx2"/>
+                </a:solidFill>
+              </a:defRPr>
+            </a:lvl3pPr>
+            <a:lvl4pPr eaLnBrk="1" hangingPunct="1">
+              <a:defRPr>
+                <a:solidFill>
+                  <a:schemeClr val="tx2"/>
+                </a:solidFill>
+              </a:defRPr>
+            </a:lvl4pPr>
+            <a:lvl5pPr eaLnBrk="1" hangingPunct="1">
+              <a:defRPr>
+                <a:solidFill>
+                  <a:schemeClr val="tx2"/>
+                </a:solidFill>
+              </a:defRPr>
+            </a:lvl5pPr>
+            <a:lvl6pPr eaLnBrk="1" hangingPunct="1">
+              <a:defRPr>
+                <a:solidFill>
+                  <a:schemeClr val="tx2"/>
+                </a:solidFill>
+              </a:defRPr>
+            </a:lvl6pPr>
+            <a:lvl7pPr eaLnBrk="1" hangingPunct="1">
+              <a:defRPr>
+                <a:solidFill>
+                  <a:schemeClr val="tx2"/>
+                </a:solidFill>
+              </a:defRPr>
+            </a:lvl7pPr>
+            <a:lvl8pPr eaLnBrk="1" hangingPunct="1">
+              <a:defRPr>
+                <a:solidFill>
+                  <a:schemeClr val="tx2"/>
+                </a:solidFill>
+              </a:defRPr>
+            </a:lvl8pPr>
+            <a:lvl9pPr eaLnBrk="1" hangingPunct="1">
+              <a:defRPr>
+                <a:solidFill>
+                  <a:schemeClr val="tx2"/>
+                </a:solidFill>
+              </a:defRPr>
+            </a:lvl9pPr>
+          </a:lstStyle>
+          <a:p>
+            <a:pPr algn="ctr"/>
+            <a:r>
+              <a:rPr lang="en-US" sz="2800" dirty="0">
+                <a:solidFill>
+                  <a:schemeClr val="tx2"/>
+                </a:solidFill>
+              </a:rPr>
+              <a:t>UNH SEDS</a:t>
+            </a:r>
+          </a:p>
+        </p:txBody>
+      </p:sp>
+      <p:sp>
+        <p:nvSpPr>
+          <p:cNvPr id="3" name="TextBox 2">
+            <a:extLst>
+              <a:ext uri="{FF2B5EF4-FFF2-40B4-BE49-F238E27FC236}">
+                <a16:creationId xmlns:a16="http://schemas.microsoft.com/office/drawing/2014/main" id="{0B5D3AB7-DC29-4013-9023-6B30F99DEBB5}"/>
+              </a:ext>
+            </a:extLst>
+          </p:cNvPr>
+          <p:cNvSpPr txBox="1"/>
+          <p:nvPr/>
+        </p:nvSpPr>
+        <p:spPr>
+          <a:xfrm>
+            <a:off x="701336" y="1247473"/>
+            <a:ext cx="3266980" cy="646331"/>
+          </a:xfrm>
+          <a:prstGeom prst="rect">
+            <a:avLst/>
+          </a:prstGeom>
+          <a:solidFill>
+            <a:schemeClr val="accent6"/>
+          </a:solidFill>
+          <a:ln>
+            <a:solidFill>
+              <a:schemeClr val="tx1"/>
+            </a:solidFill>
+          </a:ln>
+        </p:spPr>
+        <p:txBody>
+          <a:bodyPr wrap="square" rtlCol="0">
+            <a:spAutoFit/>
+          </a:bodyPr>
+          <a:lstStyle/>
+          <a:p>
+            <a:r>
+              <a:rPr lang="en-US" dirty="0">
+                <a:solidFill>
+                  <a:schemeClr val="bg1"/>
+                </a:solidFill>
+              </a:rPr>
+              <a:t>An optimized and certified Hybrid Rocket Engine</a:t>
+            </a:r>
+          </a:p>
+        </p:txBody>
+      </p:sp>
+      <p:sp>
+        <p:nvSpPr>
+          <p:cNvPr id="79" name="TextBox 78">
+            <a:extLst>
+              <a:ext uri="{FF2B5EF4-FFF2-40B4-BE49-F238E27FC236}">
+                <a16:creationId xmlns:a16="http://schemas.microsoft.com/office/drawing/2014/main" id="{950A84CE-245B-425F-A103-0489376D4B68}"/>
+              </a:ext>
+            </a:extLst>
+          </p:cNvPr>
+          <p:cNvSpPr txBox="1"/>
+          <p:nvPr/>
+        </p:nvSpPr>
+        <p:spPr>
+          <a:xfrm>
+            <a:off x="701336" y="2178825"/>
+            <a:ext cx="3266980" cy="646331"/>
+          </a:xfrm>
+          <a:prstGeom prst="rect">
+            <a:avLst/>
+          </a:prstGeom>
+          <a:solidFill>
+            <a:schemeClr val="accent6"/>
+          </a:solidFill>
+          <a:ln>
+            <a:solidFill>
+              <a:schemeClr val="tx1"/>
+            </a:solidFill>
+          </a:ln>
+        </p:spPr>
+        <p:txBody>
+          <a:bodyPr wrap="square" rtlCol="0">
+            <a:spAutoFit/>
+          </a:bodyPr>
+          <a:lstStyle/>
+          <a:p>
+            <a:r>
+              <a:rPr lang="en-US" dirty="0">
+                <a:solidFill>
+                  <a:schemeClr val="bg1"/>
+                </a:solidFill>
+              </a:rPr>
+              <a:t>A test-proven rocket engine gimbal system</a:t>
+            </a:r>
+          </a:p>
+        </p:txBody>
+      </p:sp>
+      <p:sp>
+        <p:nvSpPr>
+          <p:cNvPr id="80" name="TextBox 79">
+            <a:extLst>
+              <a:ext uri="{FF2B5EF4-FFF2-40B4-BE49-F238E27FC236}">
+                <a16:creationId xmlns:a16="http://schemas.microsoft.com/office/drawing/2014/main" id="{5C613385-B24D-4B49-B2EF-F7C7EEBD0114}"/>
+              </a:ext>
+            </a:extLst>
+          </p:cNvPr>
+          <p:cNvSpPr txBox="1"/>
+          <p:nvPr/>
+        </p:nvSpPr>
+        <p:spPr>
+          <a:xfrm>
+            <a:off x="701336" y="4031489"/>
+            <a:ext cx="3266980" cy="646331"/>
+          </a:xfrm>
+          <a:prstGeom prst="rect">
+            <a:avLst/>
+          </a:prstGeom>
+          <a:solidFill>
+            <a:schemeClr val="accent5">
+              <a:lumMod val="60000"/>
+              <a:lumOff val="40000"/>
+            </a:schemeClr>
+          </a:solidFill>
+          <a:ln>
+            <a:solidFill>
+              <a:schemeClr val="tx1"/>
+            </a:solidFill>
+          </a:ln>
+        </p:spPr>
+        <p:txBody>
+          <a:bodyPr wrap="square" rtlCol="0">
+            <a:spAutoFit/>
+          </a:bodyPr>
+          <a:lstStyle/>
+          <a:p>
+            <a:r>
+              <a:rPr lang="en-US" dirty="0">
+                <a:solidFill>
+                  <a:schemeClr val="bg1"/>
+                </a:solidFill>
+              </a:rPr>
+              <a:t>An optimized, beautifully integrated tested rocket frame</a:t>
+            </a:r>
+          </a:p>
+        </p:txBody>
+      </p:sp>
+      <p:sp>
+        <p:nvSpPr>
+          <p:cNvPr id="81" name="TextBox 80">
+            <a:extLst>
+              <a:ext uri="{FF2B5EF4-FFF2-40B4-BE49-F238E27FC236}">
+                <a16:creationId xmlns:a16="http://schemas.microsoft.com/office/drawing/2014/main" id="{102AFBFC-4FC2-4318-B51A-40C00992690B}"/>
+              </a:ext>
+            </a:extLst>
+          </p:cNvPr>
+          <p:cNvSpPr txBox="1"/>
+          <p:nvPr/>
+        </p:nvSpPr>
+        <p:spPr>
+          <a:xfrm>
+            <a:off x="701334" y="4957144"/>
+            <a:ext cx="3266981" cy="646331"/>
+          </a:xfrm>
+          <a:prstGeom prst="rect">
+            <a:avLst/>
+          </a:prstGeom>
+          <a:solidFill>
+            <a:srgbClr val="00B050"/>
+          </a:solidFill>
+          <a:ln>
+            <a:solidFill>
+              <a:schemeClr val="tx1"/>
+            </a:solidFill>
+          </a:ln>
+        </p:spPr>
+        <p:txBody>
+          <a:bodyPr wrap="square" rtlCol="0">
+            <a:spAutoFit/>
+          </a:bodyPr>
+          <a:lstStyle/>
+          <a:p>
+            <a:r>
+              <a:rPr lang="en-US" dirty="0">
+                <a:solidFill>
+                  <a:schemeClr val="bg1"/>
+                </a:solidFill>
+              </a:rPr>
+              <a:t>A beautiful, yet amazingly complex flight computer system</a:t>
+            </a:r>
+          </a:p>
+        </p:txBody>
+      </p:sp>
+      <p:sp>
+        <p:nvSpPr>
+          <p:cNvPr id="82" name="TextBox 81">
+            <a:extLst>
+              <a:ext uri="{FF2B5EF4-FFF2-40B4-BE49-F238E27FC236}">
+                <a16:creationId xmlns:a16="http://schemas.microsoft.com/office/drawing/2014/main" id="{ABC204C1-B79F-4D31-99D5-2BA55A69A9DB}"/>
+              </a:ext>
+            </a:extLst>
+          </p:cNvPr>
+          <p:cNvSpPr txBox="1"/>
+          <p:nvPr/>
+        </p:nvSpPr>
+        <p:spPr>
+          <a:xfrm>
+            <a:off x="701333" y="5882799"/>
+            <a:ext cx="3266981" cy="646331"/>
+          </a:xfrm>
+          <a:prstGeom prst="rect">
+            <a:avLst/>
+          </a:prstGeom>
+          <a:solidFill>
+            <a:srgbClr val="0070C0"/>
+          </a:solidFill>
+          <a:ln>
+            <a:solidFill>
+              <a:schemeClr val="tx1"/>
+            </a:solidFill>
+          </a:ln>
+        </p:spPr>
+        <p:txBody>
+          <a:bodyPr wrap="square" rtlCol="0">
+            <a:spAutoFit/>
+          </a:bodyPr>
+          <a:lstStyle/>
+          <a:p>
+            <a:r>
+              <a:rPr lang="en-US" dirty="0">
+                <a:solidFill>
+                  <a:schemeClr val="bg1"/>
+                </a:solidFill>
+              </a:rPr>
+              <a:t>A ROBUST payload ejection and flight recovery system</a:t>
+            </a:r>
+          </a:p>
+        </p:txBody>
+      </p:sp>
+      <p:sp>
+        <p:nvSpPr>
+          <p:cNvPr id="88" name="TextBox 87">
+            <a:extLst>
+              <a:ext uri="{FF2B5EF4-FFF2-40B4-BE49-F238E27FC236}">
+                <a16:creationId xmlns:a16="http://schemas.microsoft.com/office/drawing/2014/main" id="{45080DA4-D690-441D-93A8-5FF10FE7C274}"/>
+              </a:ext>
+            </a:extLst>
+          </p:cNvPr>
+          <p:cNvSpPr txBox="1"/>
+          <p:nvPr/>
+        </p:nvSpPr>
+        <p:spPr>
+          <a:xfrm>
+            <a:off x="701336" y="3105834"/>
+            <a:ext cx="3266980" cy="646331"/>
+          </a:xfrm>
+          <a:prstGeom prst="rect">
+            <a:avLst/>
+          </a:prstGeom>
+          <a:solidFill>
+            <a:srgbClr val="7030A0"/>
+          </a:solidFill>
+          <a:ln>
+            <a:solidFill>
+              <a:schemeClr val="tx1"/>
+            </a:solidFill>
+          </a:ln>
+        </p:spPr>
+        <p:txBody>
+          <a:bodyPr wrap="square" rtlCol="0">
+            <a:spAutoFit/>
+          </a:bodyPr>
+          <a:lstStyle/>
+          <a:p>
+            <a:r>
+              <a:rPr lang="en-US" dirty="0">
+                <a:solidFill>
+                  <a:schemeClr val="bg1"/>
+                </a:solidFill>
+              </a:rPr>
+              <a:t>A well-designed and safe testing site for all operations</a:t>
+            </a:r>
+          </a:p>
+        </p:txBody>
+      </p:sp>
+      <p:sp>
+        <p:nvSpPr>
+          <p:cNvPr id="91" name="TextBox 90">
+            <a:extLst>
+              <a:ext uri="{FF2B5EF4-FFF2-40B4-BE49-F238E27FC236}">
+                <a16:creationId xmlns:a16="http://schemas.microsoft.com/office/drawing/2014/main" id="{2A510CE4-36DC-45B0-B12E-506FAFFCAEBA}"/>
+              </a:ext>
+            </a:extLst>
+          </p:cNvPr>
+          <p:cNvSpPr txBox="1"/>
+          <p:nvPr/>
+        </p:nvSpPr>
+        <p:spPr>
+          <a:xfrm>
+            <a:off x="4462509" y="1676529"/>
+            <a:ext cx="3536271" cy="646331"/>
+          </a:xfrm>
+          <a:prstGeom prst="rect">
+            <a:avLst/>
+          </a:prstGeom>
+          <a:noFill/>
+          <a:ln>
+            <a:solidFill>
+              <a:schemeClr val="tx1"/>
+            </a:solidFill>
+          </a:ln>
+        </p:spPr>
+        <p:txBody>
+          <a:bodyPr wrap="square" rtlCol="0">
+            <a:spAutoFit/>
+          </a:bodyPr>
+          <a:lstStyle/>
+          <a:p>
+            <a:r>
+              <a:rPr lang="en-US" dirty="0"/>
+              <a:t>A seamless propulsion assembly with autonomous, real-time control</a:t>
+            </a:r>
+          </a:p>
+        </p:txBody>
+      </p:sp>
+      <p:sp>
+        <p:nvSpPr>
+          <p:cNvPr id="92" name="TextBox 91">
+            <a:extLst>
+              <a:ext uri="{FF2B5EF4-FFF2-40B4-BE49-F238E27FC236}">
+                <a16:creationId xmlns:a16="http://schemas.microsoft.com/office/drawing/2014/main" id="{FB5DE28D-C854-4554-8026-9DDDA0D78449}"/>
+              </a:ext>
+            </a:extLst>
+          </p:cNvPr>
+          <p:cNvSpPr txBox="1"/>
+          <p:nvPr/>
+        </p:nvSpPr>
+        <p:spPr>
+          <a:xfrm>
+            <a:off x="4462510" y="5396275"/>
+            <a:ext cx="3536270" cy="646331"/>
+          </a:xfrm>
+          <a:prstGeom prst="rect">
+            <a:avLst/>
+          </a:prstGeom>
+          <a:noFill/>
+          <a:ln>
+            <a:solidFill>
+              <a:schemeClr val="tx1"/>
+            </a:solidFill>
+          </a:ln>
+        </p:spPr>
+        <p:txBody>
+          <a:bodyPr wrap="square" rtlCol="0">
+            <a:spAutoFit/>
+          </a:bodyPr>
+          <a:lstStyle/>
+          <a:p>
+            <a:r>
+              <a:rPr lang="en-US" dirty="0"/>
+              <a:t>A complete navigation, control and recovery rocket electrical system</a:t>
+            </a:r>
+          </a:p>
+        </p:txBody>
+      </p:sp>
+      <p:sp>
+        <p:nvSpPr>
+          <p:cNvPr id="93" name="TextBox 92">
+            <a:extLst>
+              <a:ext uri="{FF2B5EF4-FFF2-40B4-BE49-F238E27FC236}">
+                <a16:creationId xmlns:a16="http://schemas.microsoft.com/office/drawing/2014/main" id="{1559A714-9272-4853-8553-87FC21DFD7F4}"/>
+              </a:ext>
+            </a:extLst>
+          </p:cNvPr>
+          <p:cNvSpPr txBox="1"/>
+          <p:nvPr/>
+        </p:nvSpPr>
+        <p:spPr>
+          <a:xfrm>
+            <a:off x="8954614" y="3336666"/>
+            <a:ext cx="2536050" cy="830997"/>
+          </a:xfrm>
+          <a:prstGeom prst="rect">
+            <a:avLst/>
+          </a:prstGeom>
+          <a:noFill/>
+          <a:ln>
+            <a:solidFill>
+              <a:schemeClr val="tx1"/>
+            </a:solidFill>
+          </a:ln>
+        </p:spPr>
+        <p:txBody>
+          <a:bodyPr wrap="square" rtlCol="0">
+            <a:spAutoFit/>
+          </a:bodyPr>
+          <a:lstStyle/>
+          <a:p>
+            <a:r>
+              <a:rPr lang="en-US" sz="2400" dirty="0"/>
+              <a:t>New Hampshire’s first Hybrid Rocket</a:t>
+            </a:r>
+          </a:p>
+        </p:txBody>
+      </p:sp>
+      <p:grpSp>
+        <p:nvGrpSpPr>
+          <p:cNvPr id="97" name="Group 96">
+            <a:extLst>
+              <a:ext uri="{FF2B5EF4-FFF2-40B4-BE49-F238E27FC236}">
+                <a16:creationId xmlns:a16="http://schemas.microsoft.com/office/drawing/2014/main" id="{85C094FC-E6AD-4FC4-A1CF-FD6484D80172}"/>
+              </a:ext>
+            </a:extLst>
+          </p:cNvPr>
+          <p:cNvGrpSpPr/>
+          <p:nvPr/>
+        </p:nvGrpSpPr>
+        <p:grpSpPr>
+          <a:xfrm>
+            <a:off x="4033389" y="385086"/>
+            <a:ext cx="8629165" cy="264929"/>
+            <a:chOff x="563407" y="6385235"/>
+            <a:chExt cx="3296137" cy="108000"/>
+          </a:xfrm>
+        </p:grpSpPr>
+        <p:sp>
+          <p:nvSpPr>
+            <p:cNvPr id="101" name="Rectangle 100" descr="decorative element">
+              <a:extLst>
+                <a:ext uri="{FF2B5EF4-FFF2-40B4-BE49-F238E27FC236}">
+                  <a16:creationId xmlns:a16="http://schemas.microsoft.com/office/drawing/2014/main" id="{9C79BD59-4B76-4F9A-BDD4-D9ECF4ECE0A4}"/>
+                </a:ext>
+              </a:extLst>
+            </p:cNvPr>
+            <p:cNvSpPr/>
+            <p:nvPr/>
+          </p:nvSpPr>
+          <p:spPr>
+            <a:xfrm>
+              <a:off x="1888625" y="6385235"/>
+              <a:ext cx="108000" cy="108000"/>
+            </a:xfrm>
+            <a:prstGeom prst="rect">
+              <a:avLst/>
+            </a:prstGeom>
+            <a:solidFill>
+              <a:srgbClr val="00B050"/>
+            </a:solidFill>
+            <a:ln>
+              <a:noFill/>
+            </a:ln>
+            <a:effectLst/>
+            <a:scene3d>
+              <a:camera prst="orthographicFront"/>
+              <a:lightRig rig="brightRoom" dir="t"/>
+            </a:scene3d>
+            <a:sp3d extrusionH="127000"/>
+          </p:spPr>
+          <p:style>
+            <a:lnRef idx="2">
+              <a:schemeClr val="accent1">
+                <a:hueOff val="0"/>
+                <a:satOff val="0"/>
+                <a:lumOff val="0"/>
+                <a:alphaOff val="0"/>
+              </a:schemeClr>
+            </a:lnRef>
+            <a:fillRef idx="1">
+              <a:scrgbClr r="0" g="0" b="0"/>
+            </a:fillRef>
+            <a:effectRef idx="0">
+              <a:schemeClr val="lt1">
+                <a:alpha val="90000"/>
+                <a:hueOff val="0"/>
+                <a:satOff val="0"/>
+                <a:lumOff val="0"/>
+                <a:alphaOff val="0"/>
+              </a:schemeClr>
+            </a:effectRef>
+            <a:fontRef idx="minor">
+              <a:schemeClr val="dk1">
+                <a:hueOff val="0"/>
+                <a:satOff val="0"/>
+                <a:lumOff val="0"/>
+                <a:alphaOff val="0"/>
+              </a:schemeClr>
+            </a:fontRef>
+          </p:style>
+          <p:txBody>
+            <a:bodyPr spcFirstLastPara="0" vert="horz" wrap="square" lIns="22860" tIns="5715" rIns="22860" bIns="5715" numCol="1" spcCol="1270" anchor="ctr" anchorCtr="0">
+              <a:noAutofit/>
+              <a:flatTx/>
+            </a:bodyPr>
+            <a:lstStyle/>
+            <a:p>
+              <a:pPr marL="0" lvl="0" indent="0" algn="ctr" defTabSz="400050">
+                <a:spcBef>
+                  <a:spcPct val="0"/>
+                </a:spcBef>
+                <a:spcAft>
+                  <a:spcPct val="35000"/>
+                </a:spcAft>
+                <a:buNone/>
+              </a:pPr>
+              <a:endParaRPr lang="en-US" sz="700" kern="1200" dirty="0">
+                <a:solidFill>
+                  <a:schemeClr val="bg1"/>
+                </a:solidFill>
+              </a:endParaRPr>
+            </a:p>
+          </p:txBody>
+        </p:sp>
+        <p:sp>
+          <p:nvSpPr>
+            <p:cNvPr id="103" name="Rectangle 102" descr="decorative element">
+              <a:extLst>
+                <a:ext uri="{FF2B5EF4-FFF2-40B4-BE49-F238E27FC236}">
+                  <a16:creationId xmlns:a16="http://schemas.microsoft.com/office/drawing/2014/main" id="{E64A1889-BCAA-4C7A-8E49-B3A0F9AE5C68}"/>
+                </a:ext>
+              </a:extLst>
+            </p:cNvPr>
+            <p:cNvSpPr/>
+            <p:nvPr/>
+          </p:nvSpPr>
+          <p:spPr>
+            <a:xfrm>
+              <a:off x="1240256" y="6385235"/>
+              <a:ext cx="108000" cy="108000"/>
+            </a:xfrm>
+            <a:prstGeom prst="rect">
+              <a:avLst/>
+            </a:prstGeom>
+            <a:solidFill>
+              <a:schemeClr val="accent5">
+                <a:lumMod val="60000"/>
+                <a:lumOff val="40000"/>
+              </a:schemeClr>
+            </a:solidFill>
+            <a:ln>
+              <a:noFill/>
+            </a:ln>
+            <a:effectLst/>
+            <a:scene3d>
+              <a:camera prst="orthographicFront"/>
+              <a:lightRig rig="brightRoom" dir="t"/>
+            </a:scene3d>
+            <a:sp3d extrusionH="127000"/>
+          </p:spPr>
+          <p:style>
+            <a:lnRef idx="2">
+              <a:schemeClr val="accent1">
+                <a:hueOff val="0"/>
+                <a:satOff val="0"/>
+                <a:lumOff val="0"/>
+                <a:alphaOff val="0"/>
+              </a:schemeClr>
+            </a:lnRef>
+            <a:fillRef idx="1">
+              <a:scrgbClr r="0" g="0" b="0"/>
+            </a:fillRef>
+            <a:effectRef idx="0">
+              <a:schemeClr val="lt1">
+                <a:alpha val="90000"/>
+                <a:hueOff val="0"/>
+                <a:satOff val="0"/>
+                <a:lumOff val="0"/>
+                <a:alphaOff val="0"/>
+              </a:schemeClr>
+            </a:effectRef>
+            <a:fontRef idx="minor">
+              <a:schemeClr val="dk1">
+                <a:hueOff val="0"/>
+                <a:satOff val="0"/>
+                <a:lumOff val="0"/>
+                <a:alphaOff val="0"/>
+              </a:schemeClr>
+            </a:fontRef>
+          </p:style>
+          <p:txBody>
+            <a:bodyPr spcFirstLastPara="0" vert="horz" wrap="square" lIns="22860" tIns="5715" rIns="22860" bIns="5715" numCol="1" spcCol="1270" anchor="ctr" anchorCtr="0">
+              <a:noAutofit/>
+              <a:flatTx/>
+            </a:bodyPr>
+            <a:lstStyle/>
+            <a:p>
+              <a:pPr marL="0" lvl="0" indent="0" algn="ctr" defTabSz="400050">
+                <a:spcBef>
+                  <a:spcPct val="0"/>
+                </a:spcBef>
+                <a:spcAft>
+                  <a:spcPct val="35000"/>
+                </a:spcAft>
+                <a:buNone/>
+              </a:pPr>
+              <a:endParaRPr lang="en-US" sz="700" kern="1200" dirty="0">
+                <a:solidFill>
+                  <a:schemeClr val="bg1"/>
+                </a:solidFill>
+              </a:endParaRPr>
+            </a:p>
+          </p:txBody>
+        </p:sp>
+        <p:sp>
+          <p:nvSpPr>
+            <p:cNvPr id="104" name="Rectangle 103" descr="decorative element">
+              <a:extLst>
+                <a:ext uri="{FF2B5EF4-FFF2-40B4-BE49-F238E27FC236}">
+                  <a16:creationId xmlns:a16="http://schemas.microsoft.com/office/drawing/2014/main" id="{E817AFC5-4B93-4742-BE4A-181478DEDEB0}"/>
+                </a:ext>
+              </a:extLst>
+            </p:cNvPr>
+            <p:cNvSpPr/>
+            <p:nvPr/>
+          </p:nvSpPr>
+          <p:spPr>
+            <a:xfrm>
+              <a:off x="563407" y="6385235"/>
+              <a:ext cx="108000" cy="108000"/>
+            </a:xfrm>
+            <a:prstGeom prst="rect">
+              <a:avLst/>
+            </a:prstGeom>
+            <a:solidFill>
+              <a:schemeClr val="accent6"/>
+            </a:solidFill>
+            <a:ln>
+              <a:noFill/>
+            </a:ln>
+            <a:effectLst/>
+            <a:scene3d>
+              <a:camera prst="orthographicFront"/>
+              <a:lightRig rig="brightRoom" dir="t"/>
+            </a:scene3d>
+            <a:sp3d extrusionH="127000"/>
+          </p:spPr>
+          <p:style>
+            <a:lnRef idx="2">
+              <a:schemeClr val="accent1">
+                <a:hueOff val="0"/>
+                <a:satOff val="0"/>
+                <a:lumOff val="0"/>
+                <a:alphaOff val="0"/>
+              </a:schemeClr>
+            </a:lnRef>
+            <a:fillRef idx="1">
+              <a:scrgbClr r="0" g="0" b="0"/>
+            </a:fillRef>
+            <a:effectRef idx="0">
+              <a:schemeClr val="lt1">
+                <a:alpha val="90000"/>
+                <a:hueOff val="0"/>
+                <a:satOff val="0"/>
+                <a:lumOff val="0"/>
+                <a:alphaOff val="0"/>
+              </a:schemeClr>
+            </a:effectRef>
+            <a:fontRef idx="minor">
+              <a:schemeClr val="dk1">
+                <a:hueOff val="0"/>
+                <a:satOff val="0"/>
+                <a:lumOff val="0"/>
+                <a:alphaOff val="0"/>
+              </a:schemeClr>
+            </a:fontRef>
+          </p:style>
+          <p:txBody>
+            <a:bodyPr spcFirstLastPara="0" vert="horz" wrap="square" lIns="22860" tIns="5715" rIns="22860" bIns="5715" numCol="1" spcCol="1270" anchor="ctr" anchorCtr="0">
+              <a:noAutofit/>
+              <a:flatTx/>
+            </a:bodyPr>
+            <a:lstStyle/>
+            <a:p>
+              <a:pPr marL="0" lvl="0" indent="0" algn="ctr" defTabSz="400050">
+                <a:spcBef>
+                  <a:spcPct val="0"/>
+                </a:spcBef>
+                <a:spcAft>
+                  <a:spcPct val="35000"/>
+                </a:spcAft>
+                <a:buNone/>
+              </a:pPr>
+              <a:endParaRPr lang="en-US" sz="700" kern="1200" dirty="0">
+                <a:solidFill>
+                  <a:schemeClr val="bg1"/>
+                </a:solidFill>
+              </a:endParaRPr>
+            </a:p>
+          </p:txBody>
+        </p:sp>
+        <p:sp>
+          <p:nvSpPr>
+            <p:cNvPr id="106" name="Rectangle 105" descr="decorative element">
+              <a:extLst>
+                <a:ext uri="{FF2B5EF4-FFF2-40B4-BE49-F238E27FC236}">
+                  <a16:creationId xmlns:a16="http://schemas.microsoft.com/office/drawing/2014/main" id="{64FDFE56-35FC-4219-BE6A-3F2DE8741D6D}"/>
+                </a:ext>
+              </a:extLst>
+            </p:cNvPr>
+            <p:cNvSpPr/>
+            <p:nvPr/>
+          </p:nvSpPr>
+          <p:spPr>
+            <a:xfrm>
+              <a:off x="704347" y="6385235"/>
+              <a:ext cx="542435" cy="108000"/>
+            </a:xfrm>
+            <a:prstGeom prst="rect">
+              <a:avLst/>
+            </a:prstGeom>
+            <a:noFill/>
+            <a:ln w="3175">
+              <a:noFill/>
+            </a:ln>
+            <a:effectLst/>
+            <a:scene3d>
+              <a:camera prst="orthographicFront"/>
+              <a:lightRig rig="soft" dir="t"/>
+            </a:scene3d>
+            <a:sp3d extrusionH="127000" prstMaterial="matte">
+              <a:contourClr>
+                <a:schemeClr val="tx1">
+                  <a:lumMod val="50000"/>
+                  <a:lumOff val="50000"/>
+                </a:schemeClr>
+              </a:contourClr>
+            </a:sp3d>
+          </p:spPr>
+          <p:style>
+            <a:lnRef idx="2">
+              <a:scrgbClr r="0" g="0" b="0"/>
+            </a:lnRef>
+            <a:fillRef idx="1">
+              <a:scrgbClr r="0" g="0" b="0"/>
+            </a:fillRef>
+            <a:effectRef idx="0">
+              <a:schemeClr val="accent1">
+                <a:hueOff val="0"/>
+                <a:satOff val="0"/>
+                <a:lumOff val="0"/>
+                <a:alphaOff val="0"/>
+              </a:schemeClr>
+            </a:effectRef>
+            <a:fontRef idx="minor">
+              <a:schemeClr val="lt1"/>
+            </a:fontRef>
+          </p:style>
+          <p:txBody>
+            <a:bodyPr spcFirstLastPara="0" vert="horz" wrap="square" lIns="5715" tIns="0" rIns="5715" bIns="0" numCol="1" spcCol="1270" anchor="ctr" anchorCtr="0">
+              <a:noAutofit/>
+              <a:flatTx/>
+            </a:bodyPr>
+            <a:lstStyle/>
+            <a:p>
+              <a:pPr defTabSz="400050">
+                <a:spcBef>
+                  <a:spcPct val="0"/>
+                </a:spcBef>
+                <a:spcAft>
+                  <a:spcPct val="35000"/>
+                </a:spcAft>
+              </a:pPr>
+              <a:r>
+                <a:rPr lang="en-US" sz="1000" dirty="0">
+                  <a:solidFill>
+                    <a:schemeClr val="tx1"/>
+                  </a:solidFill>
+                </a:rPr>
+                <a:t>Propulsion</a:t>
+              </a:r>
+            </a:p>
+          </p:txBody>
+        </p:sp>
+        <p:sp>
+          <p:nvSpPr>
+            <p:cNvPr id="107" name="Rectangle 106" descr="decorative element">
+              <a:extLst>
+                <a:ext uri="{FF2B5EF4-FFF2-40B4-BE49-F238E27FC236}">
+                  <a16:creationId xmlns:a16="http://schemas.microsoft.com/office/drawing/2014/main" id="{CD6F0887-42F9-4148-9645-61B5668ED2FE}"/>
+                </a:ext>
+              </a:extLst>
+            </p:cNvPr>
+            <p:cNvSpPr/>
+            <p:nvPr/>
+          </p:nvSpPr>
+          <p:spPr>
+            <a:xfrm>
+              <a:off x="1383007" y="6385235"/>
+              <a:ext cx="486599" cy="108000"/>
+            </a:xfrm>
+            <a:prstGeom prst="rect">
+              <a:avLst/>
+            </a:prstGeom>
+            <a:noFill/>
+            <a:ln w="3175">
+              <a:noFill/>
+            </a:ln>
+            <a:effectLst/>
+            <a:scene3d>
+              <a:camera prst="orthographicFront"/>
+              <a:lightRig rig="soft" dir="t"/>
+            </a:scene3d>
+            <a:sp3d extrusionH="127000" prstMaterial="matte">
+              <a:contourClr>
+                <a:schemeClr val="tx1">
+                  <a:lumMod val="50000"/>
+                  <a:lumOff val="50000"/>
+                </a:schemeClr>
+              </a:contourClr>
+            </a:sp3d>
+          </p:spPr>
+          <p:style>
+            <a:lnRef idx="2">
+              <a:scrgbClr r="0" g="0" b="0"/>
+            </a:lnRef>
+            <a:fillRef idx="1">
+              <a:scrgbClr r="0" g="0" b="0"/>
+            </a:fillRef>
+            <a:effectRef idx="0">
+              <a:schemeClr val="accent1">
+                <a:hueOff val="0"/>
+                <a:satOff val="0"/>
+                <a:lumOff val="0"/>
+                <a:alphaOff val="0"/>
+              </a:schemeClr>
+            </a:effectRef>
+            <a:fontRef idx="minor">
+              <a:schemeClr val="lt1"/>
+            </a:fontRef>
+          </p:style>
+          <p:txBody>
+            <a:bodyPr spcFirstLastPara="0" vert="horz" wrap="square" lIns="5715" tIns="0" rIns="5715" bIns="0" numCol="1" spcCol="1270" anchor="ctr" anchorCtr="0">
+              <a:noAutofit/>
+              <a:flatTx/>
+            </a:bodyPr>
+            <a:lstStyle/>
+            <a:p>
+              <a:pPr defTabSz="400050">
+                <a:spcBef>
+                  <a:spcPct val="0"/>
+                </a:spcBef>
+                <a:spcAft>
+                  <a:spcPct val="35000"/>
+                </a:spcAft>
+              </a:pPr>
+              <a:r>
+                <a:rPr lang="en-US" sz="1000" dirty="0">
+                  <a:solidFill>
+                    <a:schemeClr val="tx1"/>
+                  </a:solidFill>
+                </a:rPr>
+                <a:t>Frame</a:t>
+              </a:r>
+            </a:p>
+          </p:txBody>
+        </p:sp>
+        <p:sp>
+          <p:nvSpPr>
+            <p:cNvPr id="108" name="Rectangle 107" descr="decorative element">
+              <a:extLst>
+                <a:ext uri="{FF2B5EF4-FFF2-40B4-BE49-F238E27FC236}">
+                  <a16:creationId xmlns:a16="http://schemas.microsoft.com/office/drawing/2014/main" id="{E3A449C8-E85C-456C-8715-36E9EF8CA869}"/>
+                </a:ext>
+              </a:extLst>
+            </p:cNvPr>
+            <p:cNvSpPr/>
+            <p:nvPr/>
+          </p:nvSpPr>
+          <p:spPr>
+            <a:xfrm>
+              <a:off x="2046240" y="6385235"/>
+              <a:ext cx="629350" cy="108000"/>
+            </a:xfrm>
+            <a:prstGeom prst="rect">
+              <a:avLst/>
+            </a:prstGeom>
+            <a:noFill/>
+            <a:ln w="3175">
+              <a:noFill/>
+            </a:ln>
+            <a:effectLst/>
+            <a:scene3d>
+              <a:camera prst="orthographicFront"/>
+              <a:lightRig rig="soft" dir="t"/>
+            </a:scene3d>
+            <a:sp3d extrusionH="127000" prstMaterial="matte">
+              <a:contourClr>
+                <a:schemeClr val="tx1">
+                  <a:lumMod val="50000"/>
+                  <a:lumOff val="50000"/>
+                </a:schemeClr>
+              </a:contourClr>
+            </a:sp3d>
+          </p:spPr>
+          <p:style>
+            <a:lnRef idx="2">
+              <a:scrgbClr r="0" g="0" b="0"/>
+            </a:lnRef>
+            <a:fillRef idx="1">
+              <a:scrgbClr r="0" g="0" b="0"/>
+            </a:fillRef>
+            <a:effectRef idx="0">
+              <a:schemeClr val="accent1">
+                <a:hueOff val="0"/>
+                <a:satOff val="0"/>
+                <a:lumOff val="0"/>
+                <a:alphaOff val="0"/>
+              </a:schemeClr>
+            </a:effectRef>
+            <a:fontRef idx="minor">
+              <a:schemeClr val="lt1"/>
+            </a:fontRef>
+          </p:style>
+          <p:txBody>
+            <a:bodyPr spcFirstLastPara="0" vert="horz" wrap="square" lIns="5715" tIns="0" rIns="5715" bIns="0" numCol="1" spcCol="1270" anchor="ctr" anchorCtr="0">
+              <a:noAutofit/>
+              <a:flatTx/>
+            </a:bodyPr>
+            <a:lstStyle/>
+            <a:p>
+              <a:pPr defTabSz="400050">
+                <a:spcBef>
+                  <a:spcPct val="0"/>
+                </a:spcBef>
+                <a:spcAft>
+                  <a:spcPct val="35000"/>
+                </a:spcAft>
+              </a:pPr>
+              <a:r>
+                <a:rPr lang="en-US" sz="1000" dirty="0">
+                  <a:solidFill>
+                    <a:schemeClr val="tx1"/>
+                  </a:solidFill>
+                </a:rPr>
+                <a:t>Avionics</a:t>
+              </a:r>
+            </a:p>
+          </p:txBody>
+        </p:sp>
+        <p:sp>
+          <p:nvSpPr>
+            <p:cNvPr id="109" name="Rectangle 108" descr="decorative element">
+              <a:extLst>
+                <a:ext uri="{FF2B5EF4-FFF2-40B4-BE49-F238E27FC236}">
+                  <a16:creationId xmlns:a16="http://schemas.microsoft.com/office/drawing/2014/main" id="{2F13B98B-06D2-4F4B-85E9-A2E77C462865}"/>
+                </a:ext>
+              </a:extLst>
+            </p:cNvPr>
+            <p:cNvSpPr/>
+            <p:nvPr/>
+          </p:nvSpPr>
+          <p:spPr>
+            <a:xfrm>
+              <a:off x="3230194" y="6385235"/>
+              <a:ext cx="108000" cy="108000"/>
+            </a:xfrm>
+            <a:prstGeom prst="rect">
+              <a:avLst/>
+            </a:prstGeom>
+            <a:solidFill>
+              <a:srgbClr val="7030A0"/>
+            </a:solidFill>
+            <a:ln>
+              <a:noFill/>
+            </a:ln>
+            <a:effectLst/>
+            <a:scene3d>
+              <a:camera prst="orthographicFront"/>
+              <a:lightRig rig="brightRoom" dir="t"/>
+            </a:scene3d>
+            <a:sp3d extrusionH="127000"/>
+          </p:spPr>
+          <p:style>
+            <a:lnRef idx="2">
+              <a:schemeClr val="accent1">
+                <a:hueOff val="0"/>
+                <a:satOff val="0"/>
+                <a:lumOff val="0"/>
+                <a:alphaOff val="0"/>
+              </a:schemeClr>
+            </a:lnRef>
+            <a:fillRef idx="1">
+              <a:scrgbClr r="0" g="0" b="0"/>
+            </a:fillRef>
+            <a:effectRef idx="0">
+              <a:schemeClr val="lt1">
+                <a:alpha val="90000"/>
+                <a:hueOff val="0"/>
+                <a:satOff val="0"/>
+                <a:lumOff val="0"/>
+                <a:alphaOff val="0"/>
+              </a:schemeClr>
+            </a:effectRef>
+            <a:fontRef idx="minor">
+              <a:schemeClr val="dk1">
+                <a:hueOff val="0"/>
+                <a:satOff val="0"/>
+                <a:lumOff val="0"/>
+                <a:alphaOff val="0"/>
+              </a:schemeClr>
+            </a:fontRef>
+          </p:style>
+          <p:txBody>
+            <a:bodyPr spcFirstLastPara="0" vert="horz" wrap="square" lIns="22860" tIns="5715" rIns="22860" bIns="5715" numCol="1" spcCol="1270" anchor="ctr" anchorCtr="0">
+              <a:noAutofit/>
+              <a:flatTx/>
+            </a:bodyPr>
+            <a:lstStyle/>
+            <a:p>
+              <a:pPr marL="0" lvl="0" indent="0" algn="ctr" defTabSz="400050">
+                <a:spcBef>
+                  <a:spcPct val="0"/>
+                </a:spcBef>
+                <a:spcAft>
+                  <a:spcPct val="35000"/>
+                </a:spcAft>
+                <a:buNone/>
+              </a:pPr>
+              <a:endParaRPr lang="en-US" sz="700" kern="1200" dirty="0">
+                <a:solidFill>
+                  <a:schemeClr val="bg1"/>
+                </a:solidFill>
+              </a:endParaRPr>
+            </a:p>
+          </p:txBody>
+        </p:sp>
+        <p:sp>
+          <p:nvSpPr>
+            <p:cNvPr id="110" name="Rectangle 109" descr="decorative element">
+              <a:extLst>
+                <a:ext uri="{FF2B5EF4-FFF2-40B4-BE49-F238E27FC236}">
+                  <a16:creationId xmlns:a16="http://schemas.microsoft.com/office/drawing/2014/main" id="{1DD2ADB5-CC02-4890-8CB0-45A715F854AC}"/>
+                </a:ext>
+              </a:extLst>
+            </p:cNvPr>
+            <p:cNvSpPr/>
+            <p:nvPr/>
+          </p:nvSpPr>
+          <p:spPr>
+            <a:xfrm>
+              <a:off x="2587255" y="6385235"/>
+              <a:ext cx="108000" cy="108000"/>
+            </a:xfrm>
+            <a:prstGeom prst="rect">
+              <a:avLst/>
+            </a:prstGeom>
+            <a:solidFill>
+              <a:srgbClr val="0070C0"/>
+            </a:solidFill>
+            <a:ln>
+              <a:noFill/>
+            </a:ln>
+            <a:effectLst/>
+            <a:scene3d>
+              <a:camera prst="orthographicFront"/>
+              <a:lightRig rig="brightRoom" dir="t"/>
+            </a:scene3d>
+            <a:sp3d extrusionH="127000"/>
+          </p:spPr>
+          <p:style>
+            <a:lnRef idx="2">
+              <a:schemeClr val="accent1">
+                <a:hueOff val="0"/>
+                <a:satOff val="0"/>
+                <a:lumOff val="0"/>
+                <a:alphaOff val="0"/>
+              </a:schemeClr>
+            </a:lnRef>
+            <a:fillRef idx="1">
+              <a:scrgbClr r="0" g="0" b="0"/>
+            </a:fillRef>
+            <a:effectRef idx="0">
+              <a:schemeClr val="lt1">
+                <a:alpha val="90000"/>
+                <a:hueOff val="0"/>
+                <a:satOff val="0"/>
+                <a:lumOff val="0"/>
+                <a:alphaOff val="0"/>
+              </a:schemeClr>
+            </a:effectRef>
+            <a:fontRef idx="minor">
+              <a:schemeClr val="dk1">
+                <a:hueOff val="0"/>
+                <a:satOff val="0"/>
+                <a:lumOff val="0"/>
+                <a:alphaOff val="0"/>
+              </a:schemeClr>
+            </a:fontRef>
+          </p:style>
+          <p:txBody>
+            <a:bodyPr spcFirstLastPara="0" vert="horz" wrap="square" lIns="22860" tIns="5715" rIns="22860" bIns="5715" numCol="1" spcCol="1270" anchor="ctr" anchorCtr="0">
+              <a:noAutofit/>
+              <a:flatTx/>
+            </a:bodyPr>
+            <a:lstStyle/>
+            <a:p>
+              <a:pPr marL="0" lvl="0" indent="0" algn="ctr" defTabSz="400050">
+                <a:spcBef>
+                  <a:spcPct val="0"/>
+                </a:spcBef>
+                <a:spcAft>
+                  <a:spcPct val="35000"/>
+                </a:spcAft>
+                <a:buNone/>
+              </a:pPr>
+              <a:endParaRPr lang="en-US" sz="700" kern="1200" dirty="0">
+                <a:solidFill>
+                  <a:schemeClr val="bg1"/>
+                </a:solidFill>
+              </a:endParaRPr>
+            </a:p>
+          </p:txBody>
+        </p:sp>
+        <p:sp>
+          <p:nvSpPr>
+            <p:cNvPr id="111" name="Rectangle 110" descr="decorative element">
+              <a:extLst>
+                <a:ext uri="{FF2B5EF4-FFF2-40B4-BE49-F238E27FC236}">
+                  <a16:creationId xmlns:a16="http://schemas.microsoft.com/office/drawing/2014/main" id="{590A891C-8FC9-477A-9258-5D8D0E4E9736}"/>
+                </a:ext>
+              </a:extLst>
+            </p:cNvPr>
+            <p:cNvSpPr/>
+            <p:nvPr/>
+          </p:nvSpPr>
+          <p:spPr>
+            <a:xfrm>
+              <a:off x="2728195" y="6385235"/>
+              <a:ext cx="542435" cy="108000"/>
+            </a:xfrm>
+            <a:prstGeom prst="rect">
+              <a:avLst/>
+            </a:prstGeom>
+            <a:noFill/>
+            <a:ln w="3175">
+              <a:noFill/>
+            </a:ln>
+            <a:effectLst/>
+            <a:scene3d>
+              <a:camera prst="orthographicFront"/>
+              <a:lightRig rig="soft" dir="t"/>
+            </a:scene3d>
+            <a:sp3d extrusionH="127000" prstMaterial="matte">
+              <a:contourClr>
+                <a:schemeClr val="tx1">
+                  <a:lumMod val="50000"/>
+                  <a:lumOff val="50000"/>
+                </a:schemeClr>
+              </a:contourClr>
+            </a:sp3d>
+          </p:spPr>
+          <p:style>
+            <a:lnRef idx="2">
+              <a:scrgbClr r="0" g="0" b="0"/>
+            </a:lnRef>
+            <a:fillRef idx="1">
+              <a:scrgbClr r="0" g="0" b="0"/>
+            </a:fillRef>
+            <a:effectRef idx="0">
+              <a:schemeClr val="accent1">
+                <a:hueOff val="0"/>
+                <a:satOff val="0"/>
+                <a:lumOff val="0"/>
+                <a:alphaOff val="0"/>
+              </a:schemeClr>
+            </a:effectRef>
+            <a:fontRef idx="minor">
+              <a:schemeClr val="lt1"/>
+            </a:fontRef>
+          </p:style>
+          <p:txBody>
+            <a:bodyPr spcFirstLastPara="0" vert="horz" wrap="square" lIns="5715" tIns="0" rIns="5715" bIns="0" numCol="1" spcCol="1270" anchor="ctr" anchorCtr="0">
+              <a:noAutofit/>
+              <a:flatTx/>
+            </a:bodyPr>
+            <a:lstStyle/>
+            <a:p>
+              <a:pPr defTabSz="400050">
+                <a:spcBef>
+                  <a:spcPct val="0"/>
+                </a:spcBef>
+                <a:spcAft>
+                  <a:spcPct val="35000"/>
+                </a:spcAft>
+              </a:pPr>
+              <a:r>
+                <a:rPr lang="en-US" sz="1000" dirty="0">
+                  <a:solidFill>
+                    <a:schemeClr val="tx1"/>
+                  </a:solidFill>
+                </a:rPr>
+                <a:t>Payload/Recovery</a:t>
+              </a:r>
+            </a:p>
+          </p:txBody>
+        </p:sp>
+        <p:sp>
+          <p:nvSpPr>
+            <p:cNvPr id="112" name="Rectangle 111" descr="decorative element">
+              <a:extLst>
+                <a:ext uri="{FF2B5EF4-FFF2-40B4-BE49-F238E27FC236}">
+                  <a16:creationId xmlns:a16="http://schemas.microsoft.com/office/drawing/2014/main" id="{752BF03B-694B-4F3F-8B33-C93AA75BCFD7}"/>
+                </a:ext>
+              </a:extLst>
+            </p:cNvPr>
+            <p:cNvSpPr/>
+            <p:nvPr/>
+          </p:nvSpPr>
+          <p:spPr>
+            <a:xfrm>
+              <a:off x="3372945" y="6385235"/>
+              <a:ext cx="486599" cy="108000"/>
+            </a:xfrm>
+            <a:prstGeom prst="rect">
+              <a:avLst/>
+            </a:prstGeom>
+            <a:noFill/>
+            <a:ln w="3175">
+              <a:noFill/>
+            </a:ln>
+            <a:effectLst/>
+            <a:scene3d>
+              <a:camera prst="orthographicFront"/>
+              <a:lightRig rig="soft" dir="t"/>
+            </a:scene3d>
+            <a:sp3d extrusionH="127000" prstMaterial="matte">
+              <a:contourClr>
+                <a:schemeClr val="tx1">
+                  <a:lumMod val="50000"/>
+                  <a:lumOff val="50000"/>
+                </a:schemeClr>
+              </a:contourClr>
+            </a:sp3d>
+          </p:spPr>
+          <p:style>
+            <a:lnRef idx="2">
+              <a:scrgbClr r="0" g="0" b="0"/>
+            </a:lnRef>
+            <a:fillRef idx="1">
+              <a:scrgbClr r="0" g="0" b="0"/>
+            </a:fillRef>
+            <a:effectRef idx="0">
+              <a:schemeClr val="accent1">
+                <a:hueOff val="0"/>
+                <a:satOff val="0"/>
+                <a:lumOff val="0"/>
+                <a:alphaOff val="0"/>
+              </a:schemeClr>
+            </a:effectRef>
+            <a:fontRef idx="minor">
+              <a:schemeClr val="lt1"/>
+            </a:fontRef>
+          </p:style>
+          <p:txBody>
+            <a:bodyPr spcFirstLastPara="0" vert="horz" wrap="square" lIns="5715" tIns="0" rIns="5715" bIns="0" numCol="1" spcCol="1270" anchor="ctr" anchorCtr="0">
+              <a:noAutofit/>
+              <a:flatTx/>
+            </a:bodyPr>
+            <a:lstStyle/>
+            <a:p>
+              <a:pPr defTabSz="400050">
+                <a:spcBef>
+                  <a:spcPct val="0"/>
+                </a:spcBef>
+                <a:spcAft>
+                  <a:spcPct val="35000"/>
+                </a:spcAft>
+              </a:pPr>
+              <a:r>
+                <a:rPr lang="en-US" sz="1000" dirty="0">
+                  <a:solidFill>
+                    <a:schemeClr val="tx1"/>
+                  </a:solidFill>
+                </a:rPr>
+                <a:t>Operations</a:t>
+              </a:r>
+            </a:p>
+          </p:txBody>
+        </p:sp>
+      </p:grpSp>
+      <p:cxnSp>
+        <p:nvCxnSpPr>
+          <p:cNvPr id="6" name="Straight Arrow Connector 5">
+            <a:extLst>
+              <a:ext uri="{FF2B5EF4-FFF2-40B4-BE49-F238E27FC236}">
+                <a16:creationId xmlns:a16="http://schemas.microsoft.com/office/drawing/2014/main" id="{57190B44-E811-4217-84DF-03CECB2DEBA5}"/>
+              </a:ext>
+            </a:extLst>
+          </p:cNvPr>
+          <p:cNvCxnSpPr>
+            <a:stCxn id="3" idx="3"/>
+            <a:endCxn id="91" idx="1"/>
+          </p:cNvCxnSpPr>
+          <p:nvPr/>
+        </p:nvCxnSpPr>
+        <p:spPr>
+          <a:xfrm>
+            <a:off x="3968316" y="1570639"/>
+            <a:ext cx="494193" cy="429056"/>
+          </a:xfrm>
+          <a:prstGeom prst="straightConnector1">
+            <a:avLst/>
+          </a:prstGeom>
+          <a:ln>
+            <a:tailEnd type="triangle"/>
+          </a:ln>
+        </p:spPr>
+        <p:style>
+          <a:lnRef idx="2">
+            <a:schemeClr val="dk1"/>
+          </a:lnRef>
+          <a:fillRef idx="0">
+            <a:schemeClr val="dk1"/>
+          </a:fillRef>
+          <a:effectRef idx="1">
+            <a:schemeClr val="dk1"/>
+          </a:effectRef>
+          <a:fontRef idx="minor">
+            <a:schemeClr val="tx1"/>
+          </a:fontRef>
+        </p:style>
+      </p:cxnSp>
+      <p:cxnSp>
+        <p:nvCxnSpPr>
+          <p:cNvPr id="113" name="Straight Arrow Connector 112">
+            <a:extLst>
+              <a:ext uri="{FF2B5EF4-FFF2-40B4-BE49-F238E27FC236}">
+                <a16:creationId xmlns:a16="http://schemas.microsoft.com/office/drawing/2014/main" id="{C2A0A60F-6CE6-4675-B556-296C960DD3BA}"/>
+              </a:ext>
+            </a:extLst>
+          </p:cNvPr>
+          <p:cNvCxnSpPr>
+            <a:cxnSpLocks/>
+            <a:stCxn id="79" idx="3"/>
+            <a:endCxn id="91" idx="1"/>
+          </p:cNvCxnSpPr>
+          <p:nvPr/>
+        </p:nvCxnSpPr>
+        <p:spPr>
+          <a:xfrm flipV="1">
+            <a:off x="3968316" y="1999695"/>
+            <a:ext cx="494193" cy="502296"/>
+          </a:xfrm>
+          <a:prstGeom prst="straightConnector1">
+            <a:avLst/>
+          </a:prstGeom>
+          <a:ln>
+            <a:tailEnd type="triangle"/>
+          </a:ln>
+        </p:spPr>
+        <p:style>
+          <a:lnRef idx="2">
+            <a:schemeClr val="dk1"/>
+          </a:lnRef>
+          <a:fillRef idx="0">
+            <a:schemeClr val="dk1"/>
+          </a:fillRef>
+          <a:effectRef idx="1">
+            <a:schemeClr val="dk1"/>
+          </a:effectRef>
+          <a:fontRef idx="minor">
+            <a:schemeClr val="tx1"/>
+          </a:fontRef>
+        </p:style>
+      </p:cxnSp>
+      <p:cxnSp>
+        <p:nvCxnSpPr>
+          <p:cNvPr id="114" name="Straight Arrow Connector 113">
+            <a:extLst>
+              <a:ext uri="{FF2B5EF4-FFF2-40B4-BE49-F238E27FC236}">
+                <a16:creationId xmlns:a16="http://schemas.microsoft.com/office/drawing/2014/main" id="{CF523386-286F-4AB7-B85A-AAADDD74CECE}"/>
+              </a:ext>
+            </a:extLst>
+          </p:cNvPr>
+          <p:cNvCxnSpPr>
+            <a:cxnSpLocks/>
+            <a:stCxn id="88" idx="3"/>
+            <a:endCxn id="91" idx="1"/>
+          </p:cNvCxnSpPr>
+          <p:nvPr/>
+        </p:nvCxnSpPr>
+        <p:spPr>
+          <a:xfrm flipV="1">
+            <a:off x="3968316" y="1999695"/>
+            <a:ext cx="494193" cy="1429305"/>
+          </a:xfrm>
+          <a:prstGeom prst="straightConnector1">
+            <a:avLst/>
+          </a:prstGeom>
+          <a:ln>
+            <a:tailEnd type="triangle"/>
+          </a:ln>
+        </p:spPr>
+        <p:style>
+          <a:lnRef idx="1">
+            <a:schemeClr val="dk1"/>
+          </a:lnRef>
+          <a:fillRef idx="0">
+            <a:schemeClr val="dk1"/>
+          </a:fillRef>
+          <a:effectRef idx="0">
+            <a:schemeClr val="dk1"/>
+          </a:effectRef>
+          <a:fontRef idx="minor">
+            <a:schemeClr val="tx1"/>
+          </a:fontRef>
+        </p:style>
+      </p:cxnSp>
+      <p:cxnSp>
+        <p:nvCxnSpPr>
+          <p:cNvPr id="115" name="Straight Arrow Connector 114">
+            <a:extLst>
+              <a:ext uri="{FF2B5EF4-FFF2-40B4-BE49-F238E27FC236}">
+                <a16:creationId xmlns:a16="http://schemas.microsoft.com/office/drawing/2014/main" id="{0608B507-570C-4398-9E2E-99D4FE44A2DB}"/>
+              </a:ext>
+            </a:extLst>
+          </p:cNvPr>
+          <p:cNvCxnSpPr>
+            <a:cxnSpLocks/>
+            <a:stCxn id="80" idx="3"/>
+            <a:endCxn id="91" idx="1"/>
+          </p:cNvCxnSpPr>
+          <p:nvPr/>
+        </p:nvCxnSpPr>
+        <p:spPr>
+          <a:xfrm flipV="1">
+            <a:off x="3968316" y="1999695"/>
+            <a:ext cx="494193" cy="2354960"/>
+          </a:xfrm>
+          <a:prstGeom prst="straightConnector1">
+            <a:avLst/>
+          </a:prstGeom>
+          <a:ln>
+            <a:tailEnd type="triangle"/>
+          </a:ln>
+        </p:spPr>
+        <p:style>
+          <a:lnRef idx="1">
+            <a:schemeClr val="dk1"/>
+          </a:lnRef>
+          <a:fillRef idx="0">
+            <a:schemeClr val="dk1"/>
+          </a:fillRef>
+          <a:effectRef idx="0">
+            <a:schemeClr val="dk1"/>
+          </a:effectRef>
+          <a:fontRef idx="minor">
+            <a:schemeClr val="tx1"/>
+          </a:fontRef>
+        </p:style>
+      </p:cxnSp>
+      <p:cxnSp>
+        <p:nvCxnSpPr>
+          <p:cNvPr id="116" name="Straight Arrow Connector 115">
+            <a:extLst>
+              <a:ext uri="{FF2B5EF4-FFF2-40B4-BE49-F238E27FC236}">
+                <a16:creationId xmlns:a16="http://schemas.microsoft.com/office/drawing/2014/main" id="{02F94221-1FA8-466F-8058-B71D6D3B90F9}"/>
+              </a:ext>
+            </a:extLst>
+          </p:cNvPr>
+          <p:cNvCxnSpPr>
+            <a:cxnSpLocks/>
+            <a:stCxn id="81" idx="3"/>
+            <a:endCxn id="91" idx="1"/>
+          </p:cNvCxnSpPr>
+          <p:nvPr/>
+        </p:nvCxnSpPr>
+        <p:spPr>
+          <a:xfrm flipV="1">
+            <a:off x="3968315" y="1999695"/>
+            <a:ext cx="494194" cy="3280615"/>
+          </a:xfrm>
+          <a:prstGeom prst="straightConnector1">
+            <a:avLst/>
+          </a:prstGeom>
+          <a:ln>
+            <a:tailEnd type="triangle"/>
+          </a:ln>
+        </p:spPr>
+        <p:style>
+          <a:lnRef idx="1">
+            <a:schemeClr val="dk1"/>
+          </a:lnRef>
+          <a:fillRef idx="0">
+            <a:schemeClr val="dk1"/>
+          </a:fillRef>
+          <a:effectRef idx="0">
+            <a:schemeClr val="dk1"/>
+          </a:effectRef>
+          <a:fontRef idx="minor">
+            <a:schemeClr val="tx1"/>
+          </a:fontRef>
+        </p:style>
+      </p:cxnSp>
+      <p:cxnSp>
+        <p:nvCxnSpPr>
+          <p:cNvPr id="117" name="Straight Arrow Connector 116">
+            <a:extLst>
+              <a:ext uri="{FF2B5EF4-FFF2-40B4-BE49-F238E27FC236}">
+                <a16:creationId xmlns:a16="http://schemas.microsoft.com/office/drawing/2014/main" id="{A7021823-6076-4FF4-B2E4-EFAC09A1CB40}"/>
+              </a:ext>
+            </a:extLst>
+          </p:cNvPr>
+          <p:cNvCxnSpPr>
+            <a:cxnSpLocks/>
+            <a:stCxn id="82" idx="3"/>
+            <a:endCxn id="92" idx="1"/>
+          </p:cNvCxnSpPr>
+          <p:nvPr/>
+        </p:nvCxnSpPr>
+        <p:spPr>
+          <a:xfrm flipV="1">
+            <a:off x="3968314" y="5719441"/>
+            <a:ext cx="494196" cy="486524"/>
+          </a:xfrm>
+          <a:prstGeom prst="straightConnector1">
+            <a:avLst/>
+          </a:prstGeom>
+          <a:ln>
+            <a:tailEnd type="triangle"/>
+          </a:ln>
+        </p:spPr>
+        <p:style>
+          <a:lnRef idx="2">
+            <a:schemeClr val="dk1"/>
+          </a:lnRef>
+          <a:fillRef idx="0">
+            <a:schemeClr val="dk1"/>
+          </a:fillRef>
+          <a:effectRef idx="1">
+            <a:schemeClr val="dk1"/>
+          </a:effectRef>
+          <a:fontRef idx="minor">
+            <a:schemeClr val="tx1"/>
+          </a:fontRef>
+        </p:style>
+      </p:cxnSp>
+      <p:cxnSp>
+        <p:nvCxnSpPr>
+          <p:cNvPr id="119" name="Straight Arrow Connector 118">
+            <a:extLst>
+              <a:ext uri="{FF2B5EF4-FFF2-40B4-BE49-F238E27FC236}">
+                <a16:creationId xmlns:a16="http://schemas.microsoft.com/office/drawing/2014/main" id="{FF844689-6EF9-4350-8B23-52A8F5424A88}"/>
+              </a:ext>
+            </a:extLst>
+          </p:cNvPr>
+          <p:cNvCxnSpPr>
+            <a:cxnSpLocks/>
+            <a:stCxn id="81" idx="3"/>
+            <a:endCxn id="92" idx="1"/>
+          </p:cNvCxnSpPr>
+          <p:nvPr/>
+        </p:nvCxnSpPr>
+        <p:spPr>
+          <a:xfrm>
+            <a:off x="3968315" y="5280310"/>
+            <a:ext cx="494195" cy="439131"/>
+          </a:xfrm>
+          <a:prstGeom prst="straightConnector1">
+            <a:avLst/>
+          </a:prstGeom>
+          <a:ln>
+            <a:tailEnd type="triangle"/>
+          </a:ln>
+        </p:spPr>
+        <p:style>
+          <a:lnRef idx="2">
+            <a:schemeClr val="dk1"/>
+          </a:lnRef>
+          <a:fillRef idx="0">
+            <a:schemeClr val="dk1"/>
+          </a:fillRef>
+          <a:effectRef idx="1">
+            <a:schemeClr val="dk1"/>
+          </a:effectRef>
+          <a:fontRef idx="minor">
+            <a:schemeClr val="tx1"/>
+          </a:fontRef>
+        </p:style>
+      </p:cxnSp>
+      <p:cxnSp>
+        <p:nvCxnSpPr>
+          <p:cNvPr id="120" name="Straight Arrow Connector 119">
+            <a:extLst>
+              <a:ext uri="{FF2B5EF4-FFF2-40B4-BE49-F238E27FC236}">
+                <a16:creationId xmlns:a16="http://schemas.microsoft.com/office/drawing/2014/main" id="{A0944492-9974-4B08-AB26-49CAE125E5F8}"/>
+              </a:ext>
+            </a:extLst>
+          </p:cNvPr>
+          <p:cNvCxnSpPr>
+            <a:cxnSpLocks/>
+            <a:stCxn id="80" idx="3"/>
+            <a:endCxn id="92" idx="1"/>
+          </p:cNvCxnSpPr>
+          <p:nvPr/>
+        </p:nvCxnSpPr>
+        <p:spPr>
+          <a:xfrm>
+            <a:off x="3968316" y="4354655"/>
+            <a:ext cx="494194" cy="1364786"/>
+          </a:xfrm>
+          <a:prstGeom prst="straightConnector1">
+            <a:avLst/>
+          </a:prstGeom>
+          <a:ln>
+            <a:tailEnd type="triangle"/>
+          </a:ln>
+        </p:spPr>
+        <p:style>
+          <a:lnRef idx="1">
+            <a:schemeClr val="dk1"/>
+          </a:lnRef>
+          <a:fillRef idx="0">
+            <a:schemeClr val="dk1"/>
+          </a:fillRef>
+          <a:effectRef idx="0">
+            <a:schemeClr val="dk1"/>
+          </a:effectRef>
+          <a:fontRef idx="minor">
+            <a:schemeClr val="tx1"/>
+          </a:fontRef>
+        </p:style>
+      </p:cxnSp>
+      <p:cxnSp>
+        <p:nvCxnSpPr>
+          <p:cNvPr id="123" name="Straight Arrow Connector 122">
+            <a:extLst>
+              <a:ext uri="{FF2B5EF4-FFF2-40B4-BE49-F238E27FC236}">
+                <a16:creationId xmlns:a16="http://schemas.microsoft.com/office/drawing/2014/main" id="{BF4AB7E1-BD15-4554-8C5D-04B5CD782D44}"/>
+              </a:ext>
+            </a:extLst>
+          </p:cNvPr>
+          <p:cNvCxnSpPr>
+            <a:cxnSpLocks/>
+            <a:stCxn id="88" idx="3"/>
+            <a:endCxn id="92" idx="1"/>
+          </p:cNvCxnSpPr>
+          <p:nvPr/>
+        </p:nvCxnSpPr>
+        <p:spPr>
+          <a:xfrm>
+            <a:off x="3968316" y="3429000"/>
+            <a:ext cx="494194" cy="2290441"/>
+          </a:xfrm>
+          <a:prstGeom prst="straightConnector1">
+            <a:avLst/>
+          </a:prstGeom>
+          <a:ln>
+            <a:tailEnd type="triangle"/>
+          </a:ln>
+        </p:spPr>
+        <p:style>
+          <a:lnRef idx="1">
+            <a:schemeClr val="dk1"/>
+          </a:lnRef>
+          <a:fillRef idx="0">
+            <a:schemeClr val="dk1"/>
+          </a:fillRef>
+          <a:effectRef idx="0">
+            <a:schemeClr val="dk1"/>
+          </a:effectRef>
+          <a:fontRef idx="minor">
+            <a:schemeClr val="tx1"/>
+          </a:fontRef>
+        </p:style>
+      </p:cxnSp>
+      <p:cxnSp>
+        <p:nvCxnSpPr>
+          <p:cNvPr id="126" name="Straight Arrow Connector 125">
+            <a:extLst>
+              <a:ext uri="{FF2B5EF4-FFF2-40B4-BE49-F238E27FC236}">
+                <a16:creationId xmlns:a16="http://schemas.microsoft.com/office/drawing/2014/main" id="{038EEBA7-E493-4A12-9E7C-881758320944}"/>
+              </a:ext>
+            </a:extLst>
+          </p:cNvPr>
+          <p:cNvCxnSpPr>
+            <a:cxnSpLocks/>
+            <a:stCxn id="91" idx="3"/>
+            <a:endCxn id="93" idx="1"/>
+          </p:cNvCxnSpPr>
+          <p:nvPr/>
+        </p:nvCxnSpPr>
+        <p:spPr>
+          <a:xfrm>
+            <a:off x="7998780" y="1999695"/>
+            <a:ext cx="955834" cy="1752470"/>
+          </a:xfrm>
+          <a:prstGeom prst="straightConnector1">
+            <a:avLst/>
+          </a:prstGeom>
+          <a:ln>
+            <a:tailEnd type="triangle"/>
+          </a:ln>
+        </p:spPr>
+        <p:style>
+          <a:lnRef idx="3">
+            <a:schemeClr val="dk1"/>
+          </a:lnRef>
+          <a:fillRef idx="0">
+            <a:schemeClr val="dk1"/>
+          </a:fillRef>
+          <a:effectRef idx="2">
+            <a:schemeClr val="dk1"/>
+          </a:effectRef>
+          <a:fontRef idx="minor">
+            <a:schemeClr val="tx1"/>
+          </a:fontRef>
+        </p:style>
+      </p:cxnSp>
+      <p:cxnSp>
+        <p:nvCxnSpPr>
+          <p:cNvPr id="129" name="Straight Arrow Connector 128">
+            <a:extLst>
+              <a:ext uri="{FF2B5EF4-FFF2-40B4-BE49-F238E27FC236}">
+                <a16:creationId xmlns:a16="http://schemas.microsoft.com/office/drawing/2014/main" id="{7D42304D-EF0A-48D7-AC32-75B381FB8C7B}"/>
+              </a:ext>
+            </a:extLst>
+          </p:cNvPr>
+          <p:cNvCxnSpPr>
+            <a:cxnSpLocks/>
+            <a:stCxn id="92" idx="3"/>
+            <a:endCxn id="93" idx="1"/>
+          </p:cNvCxnSpPr>
+          <p:nvPr/>
+        </p:nvCxnSpPr>
+        <p:spPr>
+          <a:xfrm flipV="1">
+            <a:off x="7998780" y="3752165"/>
+            <a:ext cx="955834" cy="1967276"/>
+          </a:xfrm>
+          <a:prstGeom prst="straightConnector1">
+            <a:avLst/>
+          </a:prstGeom>
+          <a:ln>
+            <a:tailEnd type="triangle"/>
+          </a:ln>
+        </p:spPr>
+        <p:style>
+          <a:lnRef idx="3">
+            <a:schemeClr val="dk1"/>
+          </a:lnRef>
+          <a:fillRef idx="0">
+            <a:schemeClr val="dk1"/>
+          </a:fillRef>
+          <a:effectRef idx="2">
+            <a:schemeClr val="dk1"/>
+          </a:effectRef>
+          <a:fontRef idx="minor">
+            <a:schemeClr val="tx1"/>
+          </a:fontRef>
+        </p:style>
+      </p:cxnSp>
+      <p:cxnSp>
+        <p:nvCxnSpPr>
+          <p:cNvPr id="132" name="Straight Arrow Connector 131">
+            <a:extLst>
+              <a:ext uri="{FF2B5EF4-FFF2-40B4-BE49-F238E27FC236}">
+                <a16:creationId xmlns:a16="http://schemas.microsoft.com/office/drawing/2014/main" id="{31932B24-A914-47A0-B83D-0C371870FA23}"/>
+              </a:ext>
+            </a:extLst>
+          </p:cNvPr>
+          <p:cNvCxnSpPr>
+            <a:cxnSpLocks/>
+            <a:stCxn id="88" idx="3"/>
+            <a:endCxn id="93" idx="1"/>
+          </p:cNvCxnSpPr>
+          <p:nvPr/>
+        </p:nvCxnSpPr>
+        <p:spPr>
+          <a:xfrm>
+            <a:off x="3968316" y="3429000"/>
+            <a:ext cx="4986298" cy="323165"/>
+          </a:xfrm>
+          <a:prstGeom prst="straightConnector1">
+            <a:avLst/>
+          </a:prstGeom>
+          <a:ln>
+            <a:tailEnd type="triangle"/>
+          </a:ln>
+        </p:spPr>
+        <p:style>
+          <a:lnRef idx="3">
+            <a:schemeClr val="dk1"/>
+          </a:lnRef>
+          <a:fillRef idx="0">
+            <a:schemeClr val="dk1"/>
+          </a:fillRef>
+          <a:effectRef idx="2">
+            <a:schemeClr val="dk1"/>
+          </a:effectRef>
+          <a:fontRef idx="minor">
+            <a:schemeClr val="tx1"/>
+          </a:fontRef>
+        </p:style>
+      </p:cxnSp>
+      <p:cxnSp>
+        <p:nvCxnSpPr>
+          <p:cNvPr id="135" name="Straight Arrow Connector 134">
+            <a:extLst>
+              <a:ext uri="{FF2B5EF4-FFF2-40B4-BE49-F238E27FC236}">
+                <a16:creationId xmlns:a16="http://schemas.microsoft.com/office/drawing/2014/main" id="{F6BFF292-C6D6-4E4A-A99A-CD33694D6C07}"/>
+              </a:ext>
+            </a:extLst>
+          </p:cNvPr>
+          <p:cNvCxnSpPr>
+            <a:cxnSpLocks/>
+            <a:stCxn id="80" idx="3"/>
+            <a:endCxn id="93" idx="1"/>
+          </p:cNvCxnSpPr>
+          <p:nvPr/>
+        </p:nvCxnSpPr>
+        <p:spPr>
+          <a:xfrm flipV="1">
+            <a:off x="3968316" y="3752165"/>
+            <a:ext cx="4986298" cy="602490"/>
+          </a:xfrm>
+          <a:prstGeom prst="straightConnector1">
+            <a:avLst/>
+          </a:prstGeom>
+          <a:ln>
+            <a:tailEnd type="triangle"/>
+          </a:ln>
+        </p:spPr>
+        <p:style>
+          <a:lnRef idx="3">
+            <a:schemeClr val="dk1"/>
+          </a:lnRef>
+          <a:fillRef idx="0">
+            <a:schemeClr val="dk1"/>
+          </a:fillRef>
+          <a:effectRef idx="2">
+            <a:schemeClr val="dk1"/>
+          </a:effectRef>
+          <a:fontRef idx="minor">
+            <a:schemeClr val="tx1"/>
+          </a:fontRef>
+        </p:style>
+      </p:cxnSp>
+      <p:sp>
+        <p:nvSpPr>
+          <p:cNvPr id="46" name="Star: 5 Points 45">
+            <a:extLst>
+              <a:ext uri="{FF2B5EF4-FFF2-40B4-BE49-F238E27FC236}">
+                <a16:creationId xmlns:a16="http://schemas.microsoft.com/office/drawing/2014/main" id="{A6134AAE-0374-4139-9D60-201B4DAC8FB2}"/>
+              </a:ext>
+            </a:extLst>
+          </p:cNvPr>
+          <p:cNvSpPr/>
+          <p:nvPr/>
+        </p:nvSpPr>
+        <p:spPr>
+          <a:xfrm>
+            <a:off x="128726" y="4142103"/>
+            <a:ext cx="435006" cy="425101"/>
+          </a:xfrm>
+          <a:prstGeom prst="star5">
+            <a:avLst/>
+          </a:prstGeom>
+          <a:solidFill>
+            <a:schemeClr val="tx1"/>
+          </a:solidFill>
+        </p:spPr>
+        <p:style>
+          <a:lnRef idx="2">
+            <a:schemeClr val="accent1">
+              <a:shade val="50000"/>
+            </a:schemeClr>
+          </a:lnRef>
+          <a:fillRef idx="1">
+            <a:schemeClr val="accent1"/>
+          </a:fillRef>
+          <a:effectRef idx="0">
+            <a:schemeClr val="accent1"/>
+          </a:effectRef>
+          <a:fontRef idx="minor">
+            <a:schemeClr val="lt1"/>
+          </a:fontRef>
+        </p:style>
+        <p:txBody>
+          <a:bodyPr rtlCol="0" anchor="ctr"/>
+          <a:lstStyle/>
+          <a:p>
+            <a:pPr algn="ctr"/>
+            <a:endParaRPr lang="en-US"/>
+          </a:p>
+        </p:txBody>
+      </p:sp>
+      <p:sp>
+        <p:nvSpPr>
+          <p:cNvPr id="139" name="Star: 5 Points 138">
+            <a:extLst>
+              <a:ext uri="{FF2B5EF4-FFF2-40B4-BE49-F238E27FC236}">
+                <a16:creationId xmlns:a16="http://schemas.microsoft.com/office/drawing/2014/main" id="{324A2BA8-C80B-41CF-913C-3B3E8EC8AE08}"/>
+              </a:ext>
+            </a:extLst>
+          </p:cNvPr>
+          <p:cNvSpPr/>
+          <p:nvPr/>
+        </p:nvSpPr>
+        <p:spPr>
+          <a:xfrm>
+            <a:off x="128726" y="3214901"/>
+            <a:ext cx="435006" cy="425101"/>
+          </a:xfrm>
+          <a:prstGeom prst="star5">
+            <a:avLst/>
+          </a:prstGeom>
+          <a:solidFill>
+            <a:schemeClr val="tx1"/>
+          </a:solidFill>
+        </p:spPr>
+        <p:style>
+          <a:lnRef idx="2">
+            <a:schemeClr val="accent1">
+              <a:shade val="50000"/>
+            </a:schemeClr>
+          </a:lnRef>
+          <a:fillRef idx="1">
+            <a:schemeClr val="accent1"/>
+          </a:fillRef>
+          <a:effectRef idx="0">
+            <a:schemeClr val="accent1"/>
+          </a:effectRef>
+          <a:fontRef idx="minor">
+            <a:schemeClr val="lt1"/>
+          </a:fontRef>
+        </p:style>
+        <p:txBody>
+          <a:bodyPr rtlCol="0" anchor="ctr"/>
+          <a:lstStyle/>
+          <a:p>
+            <a:pPr algn="ctr"/>
+            <a:endParaRPr lang="en-US"/>
+          </a:p>
+        </p:txBody>
+      </p:sp>
+    </p:spTree>
+    <p:extLst>
+      <p:ext uri="{BB962C8B-B14F-4D97-AF65-F5344CB8AC3E}">
+        <p14:creationId xmlns:p14="http://schemas.microsoft.com/office/powerpoint/2010/main" val="1294478985"/>
       </p:ext>
     </p:extLst>
   </p:cSld>
@@ -12279,6 +14587,14 @@
 </file>
 
 <file path=customXml/item1.xml><?xml version="1.0" encoding="utf-8"?>
+<p:properties xmlns:p="http://schemas.microsoft.com/office/2006/metadata/properties" xmlns:xsi="http://www.w3.org/2001/XMLSchema-instance" xmlns:pc="http://schemas.microsoft.com/office/infopath/2007/PartnerControls">
+  <documentManagement>
+    <MediaServiceKeyPoints xmlns="71af3243-3dd4-4a8d-8c0d-dd76da1f02a5" xsi:nil="true"/>
+  </documentManagement>
+</p:properties>
+</file>
+
+<file path=customXml/item2.xml><?xml version="1.0" encoding="utf-8"?>
 <?mso-contentType ?>
 <FormTemplates xmlns="http://schemas.microsoft.com/sharepoint/v3/contenttype/forms">
   <Display>DocumentLibraryForm</Display>
@@ -12287,7 +14603,7 @@
 </FormTemplates>
 </file>
 
-<file path=customXml/item2.xml><?xml version="1.0" encoding="utf-8"?>
+<file path=customXml/item3.xml><?xml version="1.0" encoding="utf-8"?>
 <ct:contentTypeSchema xmlns:ct="http://schemas.microsoft.com/office/2006/metadata/contentType" xmlns:ma="http://schemas.microsoft.com/office/2006/metadata/properties/metaAttributes" ct:_="" ma:_="" ma:contentTypeName="Document" ma:contentTypeID="0x01010079F111ED35F8CC479449609E8A0923A6" ma:contentTypeVersion="11" ma:contentTypeDescription="Create a new document." ma:contentTypeScope="" ma:versionID="9677210f24a1be23c92c90fd886aa0aa">
   <xsd:schema xmlns:xsd="http://www.w3.org/2001/XMLSchema" xmlns:xs="http://www.w3.org/2001/XMLSchema" xmlns:p="http://schemas.microsoft.com/office/2006/metadata/properties" xmlns:ns2="71af3243-3dd4-4a8d-8c0d-dd76da1f02a5" xmlns:ns3="16c05727-aa75-4e4a-9b5f-8a80a1165891" targetNamespace="http://schemas.microsoft.com/office/2006/metadata/properties" ma:root="true" ma:fieldsID="60e05723c5c1908df1a1a4ebf11d344e" ns2:_="" ns3:_="">
     <xsd:import namespace="71af3243-3dd4-4a8d-8c0d-dd76da1f02a5"/>
@@ -12498,15 +14814,24 @@
 </ct:contentTypeSchema>
 </file>
 
-<file path=customXml/item3.xml><?xml version="1.0" encoding="utf-8"?>
-<p:properties xmlns:p="http://schemas.microsoft.com/office/2006/metadata/properties" xmlns:xsi="http://www.w3.org/2001/XMLSchema-instance" xmlns:pc="http://schemas.microsoft.com/office/infopath/2007/PartnerControls">
-  <documentManagement>
-    <MediaServiceKeyPoints xmlns="71af3243-3dd4-4a8d-8c0d-dd76da1f02a5" xsi:nil="true"/>
-  </documentManagement>
-</p:properties>
+<file path=customXml/itemProps1.xml><?xml version="1.0" encoding="utf-8"?>
+<ds:datastoreItem xmlns:ds="http://schemas.openxmlformats.org/officeDocument/2006/customXml" ds:itemID="{3C2AD4FE-5267-4953-9D66-004581AED1F0}">
+  <ds:schemaRefs>
+    <ds:schemaRef ds:uri="http://purl.org/dc/elements/1.1/"/>
+    <ds:schemaRef ds:uri="http://schemas.microsoft.com/office/2006/metadata/properties"/>
+    <ds:schemaRef ds:uri="http://purl.org/dc/terms/"/>
+    <ds:schemaRef ds:uri="http://schemas.openxmlformats.org/package/2006/metadata/core-properties"/>
+    <ds:schemaRef ds:uri="16c05727-aa75-4e4a-9b5f-8a80a1165891"/>
+    <ds:schemaRef ds:uri="http://schemas.microsoft.com/office/2006/documentManagement/types"/>
+    <ds:schemaRef ds:uri="http://schemas.microsoft.com/office/infopath/2007/PartnerControls"/>
+    <ds:schemaRef ds:uri="71af3243-3dd4-4a8d-8c0d-dd76da1f02a5"/>
+    <ds:schemaRef ds:uri="http://www.w3.org/XML/1998/namespace"/>
+    <ds:schemaRef ds:uri="http://purl.org/dc/dcmitype/"/>
+  </ds:schemaRefs>
+</ds:datastoreItem>
 </file>
 
-<file path=customXml/itemProps1.xml><?xml version="1.0" encoding="utf-8"?>
+<file path=customXml/itemProps2.xml><?xml version="1.0" encoding="utf-8"?>
 <ds:datastoreItem xmlns:ds="http://schemas.openxmlformats.org/officeDocument/2006/customXml" ds:itemID="{9082A0F6-5C05-4A60-9DD8-B772877A4F89}">
   <ds:schemaRefs>
     <ds:schemaRef ds:uri="http://schemas.microsoft.com/sharepoint/v3/contenttype/forms"/>
@@ -12514,7 +14839,7 @@
 </ds:datastoreItem>
 </file>
 
-<file path=customXml/itemProps2.xml><?xml version="1.0" encoding="utf-8"?>
+<file path=customXml/itemProps3.xml><?xml version="1.0" encoding="utf-8"?>
 <ds:datastoreItem xmlns:ds="http://schemas.openxmlformats.org/officeDocument/2006/customXml" ds:itemID="{840DE65C-3715-41A1-996C-103EA7902D46}">
   <ds:schemaRefs>
     <ds:schemaRef ds:uri="http://schemas.microsoft.com/office/2006/metadata/contentType"/>
@@ -12531,21 +14856,4 @@
     <ds:schemaRef ds:uri="http://schemas.microsoft.com/internal/obd"/>
   </ds:schemaRefs>
 </ds:datastoreItem>
-</file>
-
-<file path=customXml/itemProps3.xml><?xml version="1.0" encoding="utf-8"?>
-<ds:datastoreItem xmlns:ds="http://schemas.openxmlformats.org/officeDocument/2006/customXml" ds:itemID="{3C2AD4FE-5267-4953-9D66-004581AED1F0}">
-  <ds:schemaRefs>
-    <ds:schemaRef ds:uri="http://purl.org/dc/elements/1.1/"/>
-    <ds:schemaRef ds:uri="http://schemas.microsoft.com/office/2006/metadata/properties"/>
-    <ds:schemaRef ds:uri="http://purl.org/dc/terms/"/>
-    <ds:schemaRef ds:uri="http://schemas.openxmlformats.org/package/2006/metadata/core-properties"/>
-    <ds:schemaRef ds:uri="16c05727-aa75-4e4a-9b5f-8a80a1165891"/>
-    <ds:schemaRef ds:uri="http://schemas.microsoft.com/office/2006/documentManagement/types"/>
-    <ds:schemaRef ds:uri="http://schemas.microsoft.com/office/infopath/2007/PartnerControls"/>
-    <ds:schemaRef ds:uri="71af3243-3dd4-4a8d-8c0d-dd76da1f02a5"/>
-    <ds:schemaRef ds:uri="http://www.w3.org/XML/1998/namespace"/>
-    <ds:schemaRef ds:uri="http://purl.org/dc/dcmitype/"/>
-  </ds:schemaRefs>
-</ds:datastoreItem>
 </file>
</xml_diff>